<commit_message>
Added Report Updated presentation Added elitism paramater to the config
</commit_message>
<xml_diff>
--- a/Lavirint - Pronalazak izlaza iz lavirinta primenom genetskog.pptx
+++ b/Lavirint - Pronalazak izlaza iz lavirinta primenom genetskog.pptx
@@ -17,12 +17,10 @@
     <p:sldId id="266" r:id="rId11"/>
     <p:sldId id="267" r:id="rId12"/>
     <p:sldId id="268" r:id="rId13"/>
-    <p:sldId id="269" r:id="rId14"/>
-    <p:sldId id="274" r:id="rId15"/>
-    <p:sldId id="270" r:id="rId16"/>
-    <p:sldId id="272" r:id="rId17"/>
-    <p:sldId id="273" r:id="rId18"/>
-    <p:sldId id="275" r:id="rId19"/>
+    <p:sldId id="274" r:id="rId14"/>
+    <p:sldId id="272" r:id="rId15"/>
+    <p:sldId id="276" r:id="rId16"/>
+    <p:sldId id="275" r:id="rId17"/>
   </p:sldIdLst>
   <p:sldSz cx="12192000" cy="6858000"/>
   <p:notesSz cx="6858000" cy="9144000"/>
@@ -121,6 +119,11 @@
       </a:defRPr>
     </a:lvl9pPr>
   </p:defaultTextStyle>
+  <p:extLst>
+    <p:ext uri="{EFAFB233-063F-42B5-8137-9DF3F51BA10A}">
+      <p15:sldGuideLst xmlns:p15="http://schemas.microsoft.com/office/powerpoint/2012/main"/>
+    </p:ext>
+  </p:extLst>
 </p:presentation>
 </file>
 
@@ -255,7 +258,7 @@
           <a:p>
             <a:fld id="{032E9AEF-09AD-482B-9ED1-D3EB0A41B5B1}" type="datetimeFigureOut">
               <a:rPr lang="en-US" smtClean="0"/>
-              <a:t>13-Jul-25</a:t>
+              <a:t>05-Aug-25</a:t>
             </a:fld>
             <a:endParaRPr lang="en-US"/>
           </a:p>
@@ -425,7 +428,7 @@
           <a:p>
             <a:fld id="{032E9AEF-09AD-482B-9ED1-D3EB0A41B5B1}" type="datetimeFigureOut">
               <a:rPr lang="en-US" smtClean="0"/>
-              <a:t>13-Jul-25</a:t>
+              <a:t>05-Aug-25</a:t>
             </a:fld>
             <a:endParaRPr lang="en-US"/>
           </a:p>
@@ -605,7 +608,7 @@
           <a:p>
             <a:fld id="{032E9AEF-09AD-482B-9ED1-D3EB0A41B5B1}" type="datetimeFigureOut">
               <a:rPr lang="en-US" smtClean="0"/>
-              <a:t>13-Jul-25</a:t>
+              <a:t>05-Aug-25</a:t>
             </a:fld>
             <a:endParaRPr lang="en-US"/>
           </a:p>
@@ -775,7 +778,7 @@
           <a:p>
             <a:fld id="{032E9AEF-09AD-482B-9ED1-D3EB0A41B5B1}" type="datetimeFigureOut">
               <a:rPr lang="en-US" smtClean="0"/>
-              <a:t>13-Jul-25</a:t>
+              <a:t>05-Aug-25</a:t>
             </a:fld>
             <a:endParaRPr lang="en-US"/>
           </a:p>
@@ -1021,7 +1024,7 @@
           <a:p>
             <a:fld id="{032E9AEF-09AD-482B-9ED1-D3EB0A41B5B1}" type="datetimeFigureOut">
               <a:rPr lang="en-US" smtClean="0"/>
-              <a:t>13-Jul-25</a:t>
+              <a:t>05-Aug-25</a:t>
             </a:fld>
             <a:endParaRPr lang="en-US"/>
           </a:p>
@@ -1253,7 +1256,7 @@
           <a:p>
             <a:fld id="{032E9AEF-09AD-482B-9ED1-D3EB0A41B5B1}" type="datetimeFigureOut">
               <a:rPr lang="en-US" smtClean="0"/>
-              <a:t>13-Jul-25</a:t>
+              <a:t>05-Aug-25</a:t>
             </a:fld>
             <a:endParaRPr lang="en-US"/>
           </a:p>
@@ -1620,7 +1623,7 @@
           <a:p>
             <a:fld id="{032E9AEF-09AD-482B-9ED1-D3EB0A41B5B1}" type="datetimeFigureOut">
               <a:rPr lang="en-US" smtClean="0"/>
-              <a:t>13-Jul-25</a:t>
+              <a:t>05-Aug-25</a:t>
             </a:fld>
             <a:endParaRPr lang="en-US"/>
           </a:p>
@@ -1738,7 +1741,7 @@
           <a:p>
             <a:fld id="{032E9AEF-09AD-482B-9ED1-D3EB0A41B5B1}" type="datetimeFigureOut">
               <a:rPr lang="en-US" smtClean="0"/>
-              <a:t>13-Jul-25</a:t>
+              <a:t>05-Aug-25</a:t>
             </a:fld>
             <a:endParaRPr lang="en-US"/>
           </a:p>
@@ -1833,7 +1836,7 @@
           <a:p>
             <a:fld id="{032E9AEF-09AD-482B-9ED1-D3EB0A41B5B1}" type="datetimeFigureOut">
               <a:rPr lang="en-US" smtClean="0"/>
-              <a:t>13-Jul-25</a:t>
+              <a:t>05-Aug-25</a:t>
             </a:fld>
             <a:endParaRPr lang="en-US"/>
           </a:p>
@@ -2110,7 +2113,7 @@
           <a:p>
             <a:fld id="{032E9AEF-09AD-482B-9ED1-D3EB0A41B5B1}" type="datetimeFigureOut">
               <a:rPr lang="en-US" smtClean="0"/>
-              <a:t>13-Jul-25</a:t>
+              <a:t>05-Aug-25</a:t>
             </a:fld>
             <a:endParaRPr lang="en-US"/>
           </a:p>
@@ -2363,7 +2366,7 @@
           <a:p>
             <a:fld id="{032E9AEF-09AD-482B-9ED1-D3EB0A41B5B1}" type="datetimeFigureOut">
               <a:rPr lang="en-US" smtClean="0"/>
-              <a:t>13-Jul-25</a:t>
+              <a:t>05-Aug-25</a:t>
             </a:fld>
             <a:endParaRPr lang="en-US"/>
           </a:p>
@@ -2576,7 +2579,7 @@
           <a:p>
             <a:fld id="{032E9AEF-09AD-482B-9ED1-D3EB0A41B5B1}" type="datetimeFigureOut">
               <a:rPr lang="en-US" smtClean="0"/>
-              <a:t>13-Jul-25</a:t>
+              <a:t>05-Aug-25</a:t>
             </a:fld>
             <a:endParaRPr lang="en-US"/>
           </a:p>
@@ -3265,7 +3268,19 @@
             </a:pPr>
             <a:r>
               <a:rPr lang="bs-Latn-BA" sz="2000" smtClean="0"/>
-              <a:t>Objašnlenje: Kada jedna jedinka završi sa „šetnjom“ (šeta se lavirintom dok ne dođe do kraja ili pozicije iz koje ne može nastaviti dalje bez da se vrati na poziciju na kojoj je već bila) njena evaluacija (fitness) može biti jako mala iako je blizu idealnog rješenja (idealne putanje iz lavirinta) dok druge jedinke koje završe u blizini kraja lavirinta ali ne mogu iz te pozicije da dođu do samog kraja</a:t>
+              <a:t>Objašn</a:t>
+            </a:r>
+            <a:r>
+              <a:rPr lang="en-US" sz="2000" smtClean="0"/>
+              <a:t>j</a:t>
+            </a:r>
+            <a:r>
+              <a:rPr lang="bs-Latn-BA" sz="2000" smtClean="0"/>
+              <a:t>enje</a:t>
+            </a:r>
+            <a:r>
+              <a:rPr lang="bs-Latn-BA" sz="2000" smtClean="0"/>
+              <a:t>: Kada jedna jedinka završi sa „šetnjom“ (šeta se lavirintom dok ne dođe do kraja ili pozicije iz koje ne može nastaviti dalje bez da se vrati na poziciju na kojoj je već bila) njena evaluacija (fitness) može biti jako mala iako je blizu idealnog rješenja (idealne putanje iz lavirinta) dok druge jedinke koje završe u blizini kraja lavirinta ali ne mogu iz te pozicije da dođu do samog kraja</a:t>
             </a:r>
             <a:r>
               <a:rPr lang="en-US" sz="2000" smtClean="0"/>
@@ -3499,7 +3514,7 @@
         <p:spPr>
           <a:xfrm>
             <a:off x="4396631" y="2985695"/>
-            <a:ext cx="2234907" cy="461665"/>
+            <a:ext cx="2637645" cy="461665"/>
           </a:xfrm>
           <a:prstGeom prst="rect">
             <a:avLst/>
@@ -3513,8 +3528,16 @@
           <a:lstStyle/>
           <a:p>
             <a:r>
+              <a:rPr lang="en-US" sz="2400" b="1" smtClean="0"/>
+              <a:t>Optimalno</a:t>
+            </a:r>
+            <a:r>
               <a:rPr lang="bs-Latn-BA" sz="2400" b="1" smtClean="0"/>
-              <a:t>Idealno rješenje</a:t>
+              <a:t> </a:t>
+            </a:r>
+            <a:r>
+              <a:rPr lang="bs-Latn-BA" sz="2400" b="1" smtClean="0"/>
+              <a:t>rješenje</a:t>
             </a:r>
             <a:endParaRPr lang="en-US" sz="2400" b="1"/>
           </a:p>
@@ -3632,12 +3655,30 @@
             <p:ph type="title"/>
           </p:nvPr>
         </p:nvSpPr>
-        <p:spPr>
-          <a:xfrm>
-            <a:off x="829654" y="11606"/>
-            <a:ext cx="10515600" cy="1325563"/>
-          </a:xfrm>
-        </p:spPr>
+        <p:spPr/>
+        <p:txBody>
+          <a:bodyPr/>
+          <a:lstStyle/>
+          <a:p>
+            <a:r>
+              <a:rPr lang="en-US" smtClean="0"/>
+              <a:t>Rezultati</a:t>
+            </a:r>
+            <a:endParaRPr lang="en-US"/>
+          </a:p>
+        </p:txBody>
+      </p:sp>
+      <p:sp>
+        <p:nvSpPr>
+          <p:cNvPr id="3" name="Content Placeholder 2"/>
+          <p:cNvSpPr>
+            <a:spLocks noGrp="1"/>
+          </p:cNvSpPr>
+          <p:nvPr>
+            <p:ph idx="1"/>
+          </p:nvPr>
+        </p:nvSpPr>
+        <p:spPr/>
         <p:txBody>
           <a:bodyPr>
             <a:normAutofit/>
@@ -3645,203 +3686,94 @@
           <a:lstStyle/>
           <a:p>
             <a:r>
-              <a:rPr lang="en-US" sz="4000" smtClean="0"/>
-              <a:t>Populacija/jedinke</a:t>
-            </a:r>
-            <a:endParaRPr lang="en-US" sz="4000"/>
-          </a:p>
-        </p:txBody>
-      </p:sp>
-      <p:sp>
-        <p:nvSpPr>
-          <p:cNvPr id="3" name="Content Placeholder 2"/>
-          <p:cNvSpPr>
-            <a:spLocks noGrp="1"/>
-          </p:cNvSpPr>
-          <p:nvPr>
-            <p:ph idx="1"/>
-          </p:nvPr>
-        </p:nvSpPr>
-        <p:spPr>
-          <a:xfrm>
-            <a:off x="193706" y="1230594"/>
-            <a:ext cx="11351662" cy="5221481"/>
-          </a:xfrm>
-        </p:spPr>
-        <p:txBody>
-          <a:bodyPr>
-            <a:normAutofit lnSpcReduction="10000"/>
-          </a:bodyPr>
-          <a:lstStyle/>
-          <a:p>
-            <a:r>
-              <a:rPr lang="bs-Latn-BA" sz="2400" smtClean="0"/>
-              <a:t>Selekcija</a:t>
-            </a:r>
-          </a:p>
-          <a:p>
-            <a:pPr marL="457200" lvl="1" indent="0">
+              <a:rPr lang="en-US" smtClean="0"/>
+              <a:t>Specifikacije testova:</a:t>
+            </a:r>
+          </a:p>
+          <a:p>
+            <a:r>
+              <a:rPr lang="en-US" sz="1700" smtClean="0"/>
+              <a:t>Za generisanje lavirinita je kori</a:t>
+            </a:r>
+            <a:r>
+              <a:rPr lang="bs-Latn-BA" sz="1700" smtClean="0"/>
+              <a:t>š</a:t>
+            </a:r>
+            <a:r>
+              <a:rPr lang="en-US" sz="1700" smtClean="0"/>
+              <a:t>ten primov algoritam</a:t>
+            </a:r>
+          </a:p>
+          <a:p>
+            <a:r>
+              <a:rPr lang="en-US" sz="1700" smtClean="0"/>
+              <a:t>Dimenzija lavirinita je 40x20 (WxH)</a:t>
+            </a:r>
+          </a:p>
+          <a:p>
+            <a:r>
+              <a:rPr lang="en-US" sz="1700" smtClean="0"/>
+              <a:t>Broj generacija je 50</a:t>
+            </a:r>
+          </a:p>
+          <a:p>
+            <a:r>
+              <a:rPr lang="en-US" sz="1700" smtClean="0"/>
+              <a:t>Svaka generacija ima populaciju od 100 jedinki</a:t>
+            </a:r>
+          </a:p>
+          <a:p>
+            <a:r>
+              <a:rPr lang="en-US" sz="1700" smtClean="0"/>
+              <a:t>Stopa elitizma je 40% (40% najboljih jedinki ostaje u populaciji a ostalih 60% se zamjenjuje sa novom generacijom)</a:t>
+            </a:r>
+          </a:p>
+          <a:p>
+            <a:r>
+              <a:rPr lang="en-US" sz="1700" smtClean="0"/>
+              <a:t>Vjerovatno</a:t>
+            </a:r>
+            <a:r>
+              <a:rPr lang="bs-Latn-BA" sz="1700" smtClean="0"/>
+              <a:t>ća mutacije jedinke je 10%</a:t>
+            </a:r>
+          </a:p>
+          <a:p>
+            <a:r>
+              <a:rPr lang="bs-Latn-BA" sz="1700" smtClean="0"/>
+              <a:t>Početak i kraj u svakom lavirintu je: (1,1) i (38,18) </a:t>
+            </a:r>
+          </a:p>
+          <a:p>
+            <a:pPr marL="0" indent="0">
               <a:buNone/>
             </a:pPr>
             <a:r>
-              <a:rPr lang="bs-Latn-BA" sz="2000" smtClean="0"/>
-              <a:t>Kako </a:t>
-            </a:r>
-            <a:r>
-              <a:rPr lang="en-US" sz="2000" smtClean="0"/>
-              <a:t>ovaj </a:t>
-            </a:r>
-            <a:r>
-              <a:rPr lang="bs-Latn-BA" sz="2000" smtClean="0"/>
-              <a:t>riješiti problem</a:t>
-            </a:r>
-            <a:r>
-              <a:rPr lang="en-US" sz="2000" smtClean="0"/>
-              <a:t>?</a:t>
-            </a:r>
-          </a:p>
-          <a:p>
-            <a:pPr marL="457200" lvl="1" indent="0">
-              <a:buNone/>
-            </a:pPr>
-            <a:r>
-              <a:rPr lang="bs-Latn-BA" sz="2000" smtClean="0"/>
-              <a:t>Jedan način na koji je probano je pormjenom funkcije evaluacije jedinke tako što se nađe rastojanje svake pozicije u lavirintu od krajnje pozicije i onda to koristimo kao fitness jedinke. </a:t>
-            </a:r>
-          </a:p>
-          <a:p>
-            <a:pPr marL="457200" lvl="1" indent="0">
-              <a:buNone/>
-            </a:pPr>
-            <a:r>
-              <a:rPr lang="bs-Latn-BA" sz="2000" smtClean="0"/>
-              <a:t>NPR:</a:t>
-            </a:r>
-            <a:r>
-              <a:rPr lang="en-US" sz="2000" smtClean="0"/>
-              <a:t> </a:t>
-            </a:r>
-          </a:p>
-          <a:p>
-            <a:pPr marL="457200" lvl="1" indent="0">
-              <a:buNone/>
-            </a:pPr>
-            <a:r>
-              <a:rPr lang="en-US" sz="2000" smtClean="0"/>
-              <a:t>za 10x10 matricu. 	</a:t>
-            </a:r>
-          </a:p>
-          <a:p>
-            <a:pPr marL="457200" lvl="1" indent="0">
-              <a:buNone/>
-            </a:pPr>
-            <a:r>
-              <a:rPr lang="en-US" sz="2000" smtClean="0"/>
-              <a:t>“##” su zidovi</a:t>
-            </a:r>
-          </a:p>
-          <a:p>
-            <a:pPr marL="457200" lvl="1" indent="0">
-              <a:buNone/>
-            </a:pPr>
-            <a:r>
-              <a:rPr lang="en-US" sz="2000" smtClean="0"/>
-              <a:t>“SS” je po</a:t>
-            </a:r>
-            <a:r>
-              <a:rPr lang="bs-Latn-BA" sz="2000" smtClean="0"/>
-              <a:t>č</a:t>
-            </a:r>
-            <a:r>
-              <a:rPr lang="en-US" sz="2000" smtClean="0"/>
-              <a:t>etak </a:t>
-            </a:r>
-          </a:p>
-          <a:p>
-            <a:pPr marL="457200" lvl="1" indent="0">
-              <a:buNone/>
-            </a:pPr>
-            <a:r>
-              <a:rPr lang="en-US" sz="2000" smtClean="0"/>
-              <a:t>“EE” je kraj</a:t>
-            </a:r>
-          </a:p>
-          <a:p>
-            <a:pPr marL="457200" lvl="1" indent="0">
-              <a:buNone/>
-            </a:pPr>
-            <a:r>
-              <a:rPr lang="en-US" sz="2000" smtClean="0"/>
-              <a:t>brojevi su rastojanje pozicije od kraja</a:t>
-            </a:r>
-            <a:endParaRPr lang="en-US" sz="2000"/>
-          </a:p>
-          <a:p>
-            <a:pPr marL="457200" lvl="1" indent="0">
-              <a:buNone/>
-            </a:pPr>
-            <a:endParaRPr lang="en-US" sz="2000" smtClean="0"/>
-          </a:p>
-          <a:p>
-            <a:pPr marL="457200" lvl="1" indent="0">
-              <a:buNone/>
-            </a:pPr>
-            <a:endParaRPr lang="en-US" sz="2000"/>
-          </a:p>
-          <a:p>
-            <a:pPr marL="457200" lvl="1" indent="0">
-              <a:buNone/>
-            </a:pPr>
-            <a:r>
-              <a:rPr lang="bs-Latn-BA" sz="2000" smtClean="0"/>
-              <a:t>Prednost ovog rješenja je u tome što će se za svaku veličinu populacije i svaku vjerovatnoću mutacije jedinke moći naći bar 1 putanju koja dovodi do izlaza iz lavirinta.</a:t>
-            </a:r>
-          </a:p>
-          <a:p>
-            <a:pPr marL="457200" lvl="1" indent="0">
-              <a:buNone/>
-            </a:pPr>
-            <a:r>
-              <a:rPr lang="bs-Latn-BA" sz="2000" smtClean="0"/>
-              <a:t>Mana ovog pristupa je u tome što moramo pronaći rastojanje svake pozicije u lavirintu od krajnje pozicije što zauzima jako puno memorije i potrebno je puno vremena da se nadje za velike lavirinte.</a:t>
-            </a:r>
-          </a:p>
-        </p:txBody>
-      </p:sp>
-      <p:pic>
-        <p:nvPicPr>
-          <p:cNvPr id="4" name="Picture 3"/>
-          <p:cNvPicPr>
-            <a:picLocks noChangeAspect="1"/>
-          </p:cNvPicPr>
-          <p:nvPr/>
-        </p:nvPicPr>
-        <p:blipFill>
-          <a:blip r:embed="rId2">
-            <a:extLst>
-              <a:ext uri="{28A0092B-C50C-407E-A947-70E740481C1C}">
-                <a14:useLocalDpi xmlns:a14="http://schemas.microsoft.com/office/drawing/2010/main" val="0"/>
-              </a:ext>
-            </a:extLst>
-          </a:blip>
-          <a:stretch>
-            <a:fillRect/>
-          </a:stretch>
-        </p:blipFill>
-        <p:spPr>
-          <a:xfrm>
-            <a:off x="5141174" y="2556157"/>
-            <a:ext cx="3079880" cy="2318561"/>
-          </a:xfrm>
-          <a:prstGeom prst="rect">
-            <a:avLst/>
-          </a:prstGeom>
-        </p:spPr>
-      </p:pic>
+              <a:rPr lang="bs-Latn-BA" sz="1400"/>
+              <a:t>	</a:t>
+            </a:r>
+            <a:r>
+              <a:rPr lang="bs-Latn-BA" sz="1400" smtClean="0"/>
+              <a:t>Napomena: gornji lijevi ugao u lavirintu je (0,0) a donji desni ugao je (39,19)</a:t>
+            </a:r>
+            <a:r>
+              <a:rPr lang="en-US"/>
+              <a:t/>
+            </a:r>
+            <a:br>
+              <a:rPr lang="en-US"/>
+            </a:br>
+            <a:endParaRPr lang="en-US"/>
+          </a:p>
+          <a:p>
+            <a:endParaRPr lang="en-US"/>
+          </a:p>
+        </p:txBody>
+      </p:sp>
     </p:spTree>
     <p:extLst>
       <p:ext uri="{BB962C8B-B14F-4D97-AF65-F5344CB8AC3E}">
-        <p14:creationId xmlns:p14="http://schemas.microsoft.com/office/powerpoint/2010/main" val="3102046070"/>
+        <p14:creationId xmlns:p14="http://schemas.microsoft.com/office/powerpoint/2010/main" val="503888442"/>
       </p:ext>
     </p:extLst>
   </p:cSld>
@@ -3878,30 +3810,12 @@
             <p:ph type="title"/>
           </p:nvPr>
         </p:nvSpPr>
-        <p:spPr/>
-        <p:txBody>
-          <a:bodyPr/>
-          <a:lstStyle/>
-          <a:p>
-            <a:r>
-              <a:rPr lang="en-US" smtClean="0"/>
-              <a:t>Rezultati</a:t>
-            </a:r>
-            <a:endParaRPr lang="en-US"/>
-          </a:p>
-        </p:txBody>
-      </p:sp>
-      <p:sp>
-        <p:nvSpPr>
-          <p:cNvPr id="3" name="Content Placeholder 2"/>
-          <p:cNvSpPr>
-            <a:spLocks noGrp="1"/>
-          </p:cNvSpPr>
-          <p:nvPr>
-            <p:ph idx="1"/>
-          </p:nvPr>
-        </p:nvSpPr>
-        <p:spPr/>
+        <p:spPr>
+          <a:xfrm>
+            <a:off x="829654" y="11606"/>
+            <a:ext cx="10515600" cy="1325563"/>
+          </a:xfrm>
+        </p:spPr>
         <p:txBody>
           <a:bodyPr>
             <a:normAutofit/>
@@ -3909,62 +3823,38 @@
           <a:lstStyle/>
           <a:p>
             <a:r>
-              <a:rPr lang="en-US" smtClean="0"/>
-              <a:t>Specifikacije testova:</a:t>
-            </a:r>
-          </a:p>
-          <a:p>
-            <a:r>
-              <a:rPr lang="en-US" sz="1700" smtClean="0"/>
-              <a:t>Za generisanje lavirinita je kori</a:t>
-            </a:r>
-            <a:r>
-              <a:rPr lang="bs-Latn-BA" sz="1700" smtClean="0"/>
-              <a:t>š</a:t>
-            </a:r>
-            <a:r>
-              <a:rPr lang="en-US" sz="1700" smtClean="0"/>
-              <a:t>ten primov algoritam</a:t>
-            </a:r>
-          </a:p>
-          <a:p>
-            <a:r>
-              <a:rPr lang="en-US" sz="1700" smtClean="0"/>
-              <a:t>Dimenzija lavirinita je 40x20 (WxH)</a:t>
-            </a:r>
-          </a:p>
-          <a:p>
-            <a:r>
-              <a:rPr lang="en-US" sz="1700" smtClean="0"/>
-              <a:t>Broj generacija je 50</a:t>
-            </a:r>
-          </a:p>
-          <a:p>
-            <a:r>
-              <a:rPr lang="en-US" sz="1700" smtClean="0"/>
-              <a:t>Svaka generacija ima populaciju od 100 jedinki</a:t>
-            </a:r>
-          </a:p>
-          <a:p>
-            <a:r>
-              <a:rPr lang="en-US" sz="1700" smtClean="0"/>
-              <a:t>Stopa elitizma je 40% (40% najboljih jedinki ostaje u populaciji a ostalih 60% se zamjenjuje sa novom generacijom)</a:t>
-            </a:r>
-          </a:p>
-          <a:p>
-            <a:r>
-              <a:rPr lang="en-US" sz="1700" smtClean="0"/>
-              <a:t>Vjerovatno</a:t>
-            </a:r>
-            <a:r>
-              <a:rPr lang="bs-Latn-BA" sz="1700" smtClean="0"/>
-              <a:t>ća mutacije jedinke je 10%</a:t>
-            </a:r>
-          </a:p>
-          <a:p>
-            <a:r>
-              <a:rPr lang="bs-Latn-BA" sz="1700" smtClean="0"/>
-              <a:t>Početak i kraj u svakom lavirintu je: (1,1) i (38,18) </a:t>
+              <a:rPr lang="en-US" sz="4000" smtClean="0"/>
+              <a:t>Evaluacija generacije</a:t>
+            </a:r>
+            <a:endParaRPr lang="en-US" sz="4000"/>
+          </a:p>
+        </p:txBody>
+      </p:sp>
+      <p:sp>
+        <p:nvSpPr>
+          <p:cNvPr id="3" name="Content Placeholder 2"/>
+          <p:cNvSpPr>
+            <a:spLocks noGrp="1"/>
+          </p:cNvSpPr>
+          <p:nvPr>
+            <p:ph idx="1"/>
+          </p:nvPr>
+        </p:nvSpPr>
+        <p:spPr>
+          <a:xfrm>
+            <a:off x="193706" y="1230594"/>
+            <a:ext cx="11351662" cy="5221481"/>
+          </a:xfrm>
+        </p:spPr>
+        <p:txBody>
+          <a:bodyPr>
+            <a:normAutofit/>
+          </a:bodyPr>
+          <a:lstStyle/>
+          <a:p>
+            <a:r>
+              <a:rPr lang="en-US" sz="2000" smtClean="0"/>
+              <a:t>Rezultati:</a:t>
             </a:r>
           </a:p>
           <a:p>
@@ -3972,31 +3862,1008 @@
               <a:buNone/>
             </a:pPr>
             <a:r>
-              <a:rPr lang="bs-Latn-BA" sz="1400"/>
-              <a:t>	</a:t>
-            </a:r>
-            <a:r>
-              <a:rPr lang="bs-Latn-BA" sz="1400" smtClean="0"/>
-              <a:t>Napomena: gornji lijevi ugao u lavirintu je (0,0) a donji desni ugao je (39,19)</a:t>
-            </a:r>
-            <a:r>
-              <a:rPr lang="en-US"/>
-              <a:t/>
-            </a:r>
-            <a:br>
-              <a:rPr lang="en-US"/>
-            </a:br>
-            <a:endParaRPr lang="en-US"/>
-          </a:p>
-          <a:p>
-            <a:endParaRPr lang="en-US"/>
-          </a:p>
-        </p:txBody>
-      </p:sp>
+              <a:rPr lang="en-US" sz="2000" smtClean="0"/>
+              <a:t>Kada sam koristio obi</a:t>
+            </a:r>
+            <a:r>
+              <a:rPr lang="bs-Latn-BA" sz="2000"/>
+              <a:t>č</a:t>
+            </a:r>
+            <a:r>
+              <a:rPr lang="en-US" sz="2000" smtClean="0"/>
+              <a:t>nu evaluaciju svak</a:t>
+            </a:r>
+            <a:r>
+              <a:rPr lang="bs-Latn-BA" sz="2000" smtClean="0"/>
+              <a:t>e jedinke </a:t>
+            </a:r>
+            <a:r>
+              <a:rPr lang="en-US" sz="2000" smtClean="0"/>
+              <a:t>pomo</a:t>
+            </a:r>
+            <a:r>
+              <a:rPr lang="bs-Latn-BA" sz="2000" smtClean="0"/>
+              <a:t>ć</a:t>
+            </a:r>
+            <a:r>
+              <a:rPr lang="en-US" sz="2000" smtClean="0"/>
+              <a:t>u </a:t>
+            </a:r>
+            <a:r>
+              <a:rPr lang="en-US" sz="2000" b="1" smtClean="0"/>
+              <a:t>Mannhattan</a:t>
+            </a:r>
+            <a:r>
+              <a:rPr lang="en-US" sz="2000" smtClean="0"/>
+              <a:t> rastojanja</a:t>
+            </a:r>
+            <a:r>
+              <a:rPr lang="en-US" sz="2000" smtClean="0"/>
+              <a:t>:</a:t>
+            </a:r>
+            <a:endParaRPr lang="bs-Latn-BA" sz="2000" smtClean="0"/>
+          </a:p>
+          <a:p>
+            <a:pPr marL="0" indent="0">
+              <a:buNone/>
+            </a:pPr>
+            <a:r>
+              <a:rPr lang="en-US" sz="2000" smtClean="0"/>
+              <a:t>-&gt; </a:t>
+            </a:r>
+            <a:r>
+              <a:rPr lang="bs-Latn-BA" sz="2000" smtClean="0"/>
+              <a:t>srednja </a:t>
+            </a:r>
+            <a:r>
+              <a:rPr lang="bs-Latn-BA" sz="2000"/>
+              <a:t>evaluacija generacija bila </a:t>
+            </a:r>
+            <a:r>
+              <a:rPr lang="bs-Latn-BA" sz="2000" b="1"/>
+              <a:t>8.72 </a:t>
+            </a:r>
+            <a:r>
+              <a:rPr lang="bs-Latn-BA" sz="2000"/>
+              <a:t>a broj riješenih </a:t>
+            </a:r>
+            <a:r>
+              <a:rPr lang="bs-Latn-BA" sz="2000"/>
+              <a:t>problema </a:t>
+            </a:r>
+            <a:r>
+              <a:rPr lang="bs-Latn-BA" sz="2000" b="1" smtClean="0"/>
+              <a:t>1/11 </a:t>
+            </a:r>
+            <a:r>
+              <a:rPr lang="bs-Latn-BA" sz="2000"/>
+              <a:t>sa stopom mutacije od 0.1 i stopom elitizma </a:t>
+            </a:r>
+            <a:r>
+              <a:rPr lang="bs-Latn-BA" sz="2000"/>
+              <a:t>od </a:t>
+            </a:r>
+            <a:r>
+              <a:rPr lang="bs-Latn-BA" sz="2000" smtClean="0"/>
+              <a:t>0.4</a:t>
+            </a:r>
+            <a:endParaRPr lang="en-US" sz="2000" smtClean="0"/>
+          </a:p>
+          <a:p>
+            <a:pPr marL="0" indent="0">
+              <a:buNone/>
+            </a:pPr>
+            <a:endParaRPr lang="en-US" sz="2000"/>
+          </a:p>
+          <a:p>
+            <a:pPr marL="0" indent="0">
+              <a:buNone/>
+            </a:pPr>
+            <a:r>
+              <a:rPr lang="en-US" sz="2000"/>
+              <a:t>Kada sam koristio obi</a:t>
+            </a:r>
+            <a:r>
+              <a:rPr lang="bs-Latn-BA" sz="2000"/>
+              <a:t>č</a:t>
+            </a:r>
+            <a:r>
+              <a:rPr lang="en-US" sz="2000"/>
+              <a:t>nu evaluaciju svak</a:t>
+            </a:r>
+            <a:r>
+              <a:rPr lang="bs-Latn-BA" sz="2000"/>
+              <a:t>e</a:t>
+            </a:r>
+            <a:r>
+              <a:rPr lang="en-US" sz="2000"/>
+              <a:t> </a:t>
+            </a:r>
+            <a:r>
+              <a:rPr lang="bs-Latn-BA" sz="2000"/>
+              <a:t>jedinke </a:t>
+            </a:r>
+            <a:r>
+              <a:rPr lang="en-US" sz="2000"/>
+              <a:t>pomo</a:t>
+            </a:r>
+            <a:r>
+              <a:rPr lang="bs-Latn-BA" sz="2000"/>
+              <a:t>ć</a:t>
+            </a:r>
+            <a:r>
+              <a:rPr lang="en-US" sz="2000"/>
+              <a:t>u </a:t>
+            </a:r>
+            <a:r>
+              <a:rPr lang="en-US" sz="2000" b="1"/>
+              <a:t>Euklidskog </a:t>
+            </a:r>
+            <a:r>
+              <a:rPr lang="en-US" sz="2000"/>
+              <a:t>rastojanja</a:t>
+            </a:r>
+            <a:r>
+              <a:rPr lang="en-US" sz="2000" smtClean="0"/>
+              <a:t>:</a:t>
+            </a:r>
+          </a:p>
+          <a:p>
+            <a:pPr marL="0" indent="0">
+              <a:buNone/>
+            </a:pPr>
+            <a:endParaRPr lang="en-US" sz="2000"/>
+          </a:p>
+          <a:p>
+            <a:pPr marL="0" indent="0">
+              <a:buNone/>
+            </a:pPr>
+            <a:endParaRPr lang="en-US" sz="2000" smtClean="0"/>
+          </a:p>
+          <a:p>
+            <a:pPr marL="0" indent="0">
+              <a:buNone/>
+            </a:pPr>
+            <a:endParaRPr lang="bs-Latn-BA" sz="1100" smtClean="0"/>
+          </a:p>
+        </p:txBody>
+      </p:sp>
+      <p:graphicFrame>
+        <p:nvGraphicFramePr>
+          <p:cNvPr id="4" name="Table 3"/>
+          <p:cNvGraphicFramePr>
+            <a:graphicFrameLocks noGrp="1"/>
+          </p:cNvGraphicFramePr>
+          <p:nvPr>
+            <p:extLst>
+              <p:ext uri="{D42A27DB-BD31-4B8C-83A1-F6EECF244321}">
+                <p14:modId xmlns:p14="http://schemas.microsoft.com/office/powerpoint/2010/main" val="1452097059"/>
+              </p:ext>
+            </p:extLst>
+          </p:nvPr>
+        </p:nvGraphicFramePr>
+        <p:xfrm>
+          <a:off x="419101" y="3505203"/>
+          <a:ext cx="7688578" cy="1584957"/>
+        </p:xfrm>
+        <a:graphic>
+          <a:graphicData uri="http://schemas.openxmlformats.org/drawingml/2006/table">
+            <a:tbl>
+              <a:tblPr firstRow="1" firstCol="1" bandRow="1">
+                <a:tableStyleId>{5C22544A-7EE6-4342-B048-85BDC9FD1C3A}</a:tableStyleId>
+              </a:tblPr>
+              <a:tblGrid>
+                <a:gridCol w="1921734"/>
+                <a:gridCol w="1921734"/>
+                <a:gridCol w="1922555"/>
+                <a:gridCol w="1922555"/>
+              </a:tblGrid>
+              <a:tr h="493242">
+                <a:tc>
+                  <a:txBody>
+                    <a:bodyPr/>
+                    <a:lstStyle/>
+                    <a:p>
+                      <a:pPr marL="0" marR="0">
+                        <a:lnSpc>
+                          <a:spcPct val="107000"/>
+                        </a:lnSpc>
+                        <a:spcBef>
+                          <a:spcPts val="0"/>
+                        </a:spcBef>
+                        <a:spcAft>
+                          <a:spcPts val="0"/>
+                        </a:spcAft>
+                      </a:pPr>
+                      <a:r>
+                        <a:rPr lang="bs-Latn-BA" sz="1300">
+                          <a:effectLst/>
+                        </a:rPr>
+                        <a:t>Stopa mutacije</a:t>
+                      </a:r>
+                      <a:endParaRPr lang="en-US" sz="1100">
+                        <a:effectLst/>
+                        <a:latin typeface="Calibri" panose="020F0502020204030204" pitchFamily="34" charset="0"/>
+                        <a:ea typeface="Calibri" panose="020F0502020204030204" pitchFamily="34" charset="0"/>
+                        <a:cs typeface="Times New Roman" panose="02020603050405020304" pitchFamily="18" charset="0"/>
+                      </a:endParaRPr>
+                    </a:p>
+                  </a:txBody>
+                  <a:tcPr marL="68580" marR="68580" marT="0" marB="0"/>
+                </a:tc>
+                <a:tc>
+                  <a:txBody>
+                    <a:bodyPr/>
+                    <a:lstStyle/>
+                    <a:p>
+                      <a:pPr marL="0" marR="0">
+                        <a:lnSpc>
+                          <a:spcPct val="107000"/>
+                        </a:lnSpc>
+                        <a:spcBef>
+                          <a:spcPts val="0"/>
+                        </a:spcBef>
+                        <a:spcAft>
+                          <a:spcPts val="0"/>
+                        </a:spcAft>
+                      </a:pPr>
+                      <a:r>
+                        <a:rPr lang="bs-Latn-BA" sz="1300">
+                          <a:effectLst/>
+                        </a:rPr>
+                        <a:t>Stopa elitizma</a:t>
+                      </a:r>
+                      <a:endParaRPr lang="en-US" sz="1100">
+                        <a:effectLst/>
+                        <a:latin typeface="Calibri" panose="020F0502020204030204" pitchFamily="34" charset="0"/>
+                        <a:ea typeface="Calibri" panose="020F0502020204030204" pitchFamily="34" charset="0"/>
+                        <a:cs typeface="Times New Roman" panose="02020603050405020304" pitchFamily="18" charset="0"/>
+                      </a:endParaRPr>
+                    </a:p>
+                  </a:txBody>
+                  <a:tcPr marL="68580" marR="68580" marT="0" marB="0"/>
+                </a:tc>
+                <a:tc>
+                  <a:txBody>
+                    <a:bodyPr/>
+                    <a:lstStyle/>
+                    <a:p>
+                      <a:pPr marL="0" marR="0">
+                        <a:lnSpc>
+                          <a:spcPct val="107000"/>
+                        </a:lnSpc>
+                        <a:spcBef>
+                          <a:spcPts val="0"/>
+                        </a:spcBef>
+                        <a:spcAft>
+                          <a:spcPts val="0"/>
+                        </a:spcAft>
+                      </a:pPr>
+                      <a:r>
+                        <a:rPr lang="bs-Latn-BA" sz="1300">
+                          <a:effectLst/>
+                        </a:rPr>
+                        <a:t>Prosječna evaluacija</a:t>
+                      </a:r>
+                      <a:endParaRPr lang="en-US" sz="1100">
+                        <a:effectLst/>
+                        <a:latin typeface="Calibri" panose="020F0502020204030204" pitchFamily="34" charset="0"/>
+                        <a:ea typeface="Calibri" panose="020F0502020204030204" pitchFamily="34" charset="0"/>
+                        <a:cs typeface="Times New Roman" panose="02020603050405020304" pitchFamily="18" charset="0"/>
+                      </a:endParaRPr>
+                    </a:p>
+                  </a:txBody>
+                  <a:tcPr marL="68580" marR="68580" marT="0" marB="0"/>
+                </a:tc>
+                <a:tc>
+                  <a:txBody>
+                    <a:bodyPr/>
+                    <a:lstStyle/>
+                    <a:p>
+                      <a:pPr marL="0" marR="0">
+                        <a:lnSpc>
+                          <a:spcPct val="107000"/>
+                        </a:lnSpc>
+                        <a:spcBef>
+                          <a:spcPts val="0"/>
+                        </a:spcBef>
+                        <a:spcAft>
+                          <a:spcPts val="0"/>
+                        </a:spcAft>
+                      </a:pPr>
+                      <a:r>
+                        <a:rPr lang="bs-Latn-BA" sz="1300">
+                          <a:effectLst/>
+                        </a:rPr>
+                        <a:t>Broj riješenih problema </a:t>
+                      </a:r>
+                      <a:r>
+                        <a:rPr lang="bs-Latn-BA" sz="1300">
+                          <a:effectLst/>
+                        </a:rPr>
+                        <a:t>od </a:t>
+                      </a:r>
+                      <a:r>
+                        <a:rPr lang="bs-Latn-BA" sz="1300" smtClean="0">
+                          <a:effectLst/>
+                        </a:rPr>
+                        <a:t>1</a:t>
+                      </a:r>
+                      <a:r>
+                        <a:rPr lang="en-US" sz="1300" smtClean="0">
+                          <a:effectLst/>
+                        </a:rPr>
+                        <a:t>1</a:t>
+                      </a:r>
+                      <a:endParaRPr lang="en-US" sz="1100">
+                        <a:effectLst/>
+                        <a:latin typeface="Calibri" panose="020F0502020204030204" pitchFamily="34" charset="0"/>
+                        <a:ea typeface="Calibri" panose="020F0502020204030204" pitchFamily="34" charset="0"/>
+                        <a:cs typeface="Times New Roman" panose="02020603050405020304" pitchFamily="18" charset="0"/>
+                      </a:endParaRPr>
+                    </a:p>
+                  </a:txBody>
+                  <a:tcPr marL="68580" marR="68580" marT="0" marB="0"/>
+                </a:tc>
+              </a:tr>
+              <a:tr h="218343">
+                <a:tc>
+                  <a:txBody>
+                    <a:bodyPr/>
+                    <a:lstStyle/>
+                    <a:p>
+                      <a:pPr marL="0" marR="0">
+                        <a:lnSpc>
+                          <a:spcPct val="107000"/>
+                        </a:lnSpc>
+                        <a:spcBef>
+                          <a:spcPts val="0"/>
+                        </a:spcBef>
+                        <a:spcAft>
+                          <a:spcPts val="0"/>
+                        </a:spcAft>
+                      </a:pPr>
+                      <a:r>
+                        <a:rPr lang="bs-Latn-BA" sz="1300">
+                          <a:effectLst/>
+                        </a:rPr>
+                        <a:t>0.1</a:t>
+                      </a:r>
+                      <a:endParaRPr lang="en-US" sz="1100">
+                        <a:effectLst/>
+                        <a:latin typeface="Calibri" panose="020F0502020204030204" pitchFamily="34" charset="0"/>
+                        <a:ea typeface="Calibri" panose="020F0502020204030204" pitchFamily="34" charset="0"/>
+                        <a:cs typeface="Times New Roman" panose="02020603050405020304" pitchFamily="18" charset="0"/>
+                      </a:endParaRPr>
+                    </a:p>
+                  </a:txBody>
+                  <a:tcPr marL="68580" marR="68580" marT="0" marB="0"/>
+                </a:tc>
+                <a:tc>
+                  <a:txBody>
+                    <a:bodyPr/>
+                    <a:lstStyle/>
+                    <a:p>
+                      <a:pPr marL="0" marR="0">
+                        <a:lnSpc>
+                          <a:spcPct val="107000"/>
+                        </a:lnSpc>
+                        <a:spcBef>
+                          <a:spcPts val="0"/>
+                        </a:spcBef>
+                        <a:spcAft>
+                          <a:spcPts val="0"/>
+                        </a:spcAft>
+                      </a:pPr>
+                      <a:r>
+                        <a:rPr lang="bs-Latn-BA" sz="1300">
+                          <a:effectLst/>
+                        </a:rPr>
+                        <a:t>0.0</a:t>
+                      </a:r>
+                      <a:endParaRPr lang="en-US" sz="1100">
+                        <a:effectLst/>
+                        <a:latin typeface="Calibri" panose="020F0502020204030204" pitchFamily="34" charset="0"/>
+                        <a:ea typeface="Calibri" panose="020F0502020204030204" pitchFamily="34" charset="0"/>
+                        <a:cs typeface="Times New Roman" panose="02020603050405020304" pitchFamily="18" charset="0"/>
+                      </a:endParaRPr>
+                    </a:p>
+                  </a:txBody>
+                  <a:tcPr marL="68580" marR="68580" marT="0" marB="0"/>
+                </a:tc>
+                <a:tc>
+                  <a:txBody>
+                    <a:bodyPr/>
+                    <a:lstStyle/>
+                    <a:p>
+                      <a:pPr marL="0" marR="0">
+                        <a:lnSpc>
+                          <a:spcPct val="107000"/>
+                        </a:lnSpc>
+                        <a:spcBef>
+                          <a:spcPts val="0"/>
+                        </a:spcBef>
+                        <a:spcAft>
+                          <a:spcPts val="0"/>
+                        </a:spcAft>
+                      </a:pPr>
+                      <a:r>
+                        <a:rPr lang="bs-Latn-BA" sz="1300">
+                          <a:effectLst/>
+                        </a:rPr>
+                        <a:t>19.6</a:t>
+                      </a:r>
+                      <a:endParaRPr lang="en-US" sz="1100">
+                        <a:effectLst/>
+                        <a:latin typeface="Calibri" panose="020F0502020204030204" pitchFamily="34" charset="0"/>
+                        <a:ea typeface="Calibri" panose="020F0502020204030204" pitchFamily="34" charset="0"/>
+                        <a:cs typeface="Times New Roman" panose="02020603050405020304" pitchFamily="18" charset="0"/>
+                      </a:endParaRPr>
+                    </a:p>
+                  </a:txBody>
+                  <a:tcPr marL="68580" marR="68580" marT="0" marB="0"/>
+                </a:tc>
+                <a:tc>
+                  <a:txBody>
+                    <a:bodyPr/>
+                    <a:lstStyle/>
+                    <a:p>
+                      <a:pPr marL="0" marR="0">
+                        <a:lnSpc>
+                          <a:spcPct val="107000"/>
+                        </a:lnSpc>
+                        <a:spcBef>
+                          <a:spcPts val="0"/>
+                        </a:spcBef>
+                        <a:spcAft>
+                          <a:spcPts val="0"/>
+                        </a:spcAft>
+                      </a:pPr>
+                      <a:r>
+                        <a:rPr lang="bs-Latn-BA" sz="1300">
+                          <a:effectLst/>
+                        </a:rPr>
+                        <a:t>0</a:t>
+                      </a:r>
+                      <a:endParaRPr lang="en-US" sz="1100">
+                        <a:effectLst/>
+                        <a:latin typeface="Calibri" panose="020F0502020204030204" pitchFamily="34" charset="0"/>
+                        <a:ea typeface="Calibri" panose="020F0502020204030204" pitchFamily="34" charset="0"/>
+                        <a:cs typeface="Times New Roman" panose="02020603050405020304" pitchFamily="18" charset="0"/>
+                      </a:endParaRPr>
+                    </a:p>
+                  </a:txBody>
+                  <a:tcPr marL="68580" marR="68580" marT="0" marB="0"/>
+                </a:tc>
+              </a:tr>
+              <a:tr h="218343">
+                <a:tc>
+                  <a:txBody>
+                    <a:bodyPr/>
+                    <a:lstStyle/>
+                    <a:p>
+                      <a:pPr marL="0" marR="0">
+                        <a:lnSpc>
+                          <a:spcPct val="107000"/>
+                        </a:lnSpc>
+                        <a:spcBef>
+                          <a:spcPts val="0"/>
+                        </a:spcBef>
+                        <a:spcAft>
+                          <a:spcPts val="0"/>
+                        </a:spcAft>
+                      </a:pPr>
+                      <a:r>
+                        <a:rPr lang="bs-Latn-BA" sz="1300">
+                          <a:effectLst/>
+                        </a:rPr>
+                        <a:t>0.1</a:t>
+                      </a:r>
+                      <a:endParaRPr lang="en-US" sz="1100">
+                        <a:effectLst/>
+                        <a:latin typeface="Calibri" panose="020F0502020204030204" pitchFamily="34" charset="0"/>
+                        <a:ea typeface="Calibri" panose="020F0502020204030204" pitchFamily="34" charset="0"/>
+                        <a:cs typeface="Times New Roman" panose="02020603050405020304" pitchFamily="18" charset="0"/>
+                      </a:endParaRPr>
+                    </a:p>
+                  </a:txBody>
+                  <a:tcPr marL="68580" marR="68580" marT="0" marB="0"/>
+                </a:tc>
+                <a:tc>
+                  <a:txBody>
+                    <a:bodyPr/>
+                    <a:lstStyle/>
+                    <a:p>
+                      <a:pPr marL="0" marR="0">
+                        <a:lnSpc>
+                          <a:spcPct val="107000"/>
+                        </a:lnSpc>
+                        <a:spcBef>
+                          <a:spcPts val="0"/>
+                        </a:spcBef>
+                        <a:spcAft>
+                          <a:spcPts val="0"/>
+                        </a:spcAft>
+                      </a:pPr>
+                      <a:r>
+                        <a:rPr lang="bs-Latn-BA" sz="1300">
+                          <a:effectLst/>
+                        </a:rPr>
+                        <a:t>0.2</a:t>
+                      </a:r>
+                      <a:endParaRPr lang="en-US" sz="1100">
+                        <a:effectLst/>
+                        <a:latin typeface="Calibri" panose="020F0502020204030204" pitchFamily="34" charset="0"/>
+                        <a:ea typeface="Calibri" panose="020F0502020204030204" pitchFamily="34" charset="0"/>
+                        <a:cs typeface="Times New Roman" panose="02020603050405020304" pitchFamily="18" charset="0"/>
+                      </a:endParaRPr>
+                    </a:p>
+                  </a:txBody>
+                  <a:tcPr marL="68580" marR="68580" marT="0" marB="0"/>
+                </a:tc>
+                <a:tc>
+                  <a:txBody>
+                    <a:bodyPr/>
+                    <a:lstStyle/>
+                    <a:p>
+                      <a:pPr marL="0" marR="0">
+                        <a:lnSpc>
+                          <a:spcPct val="107000"/>
+                        </a:lnSpc>
+                        <a:spcBef>
+                          <a:spcPts val="0"/>
+                        </a:spcBef>
+                        <a:spcAft>
+                          <a:spcPts val="0"/>
+                        </a:spcAft>
+                      </a:pPr>
+                      <a:r>
+                        <a:rPr lang="bs-Latn-BA" sz="1300">
+                          <a:effectLst/>
+                        </a:rPr>
+                        <a:t>5.65</a:t>
+                      </a:r>
+                      <a:endParaRPr lang="en-US" sz="1100">
+                        <a:effectLst/>
+                        <a:latin typeface="Calibri" panose="020F0502020204030204" pitchFamily="34" charset="0"/>
+                        <a:ea typeface="Calibri" panose="020F0502020204030204" pitchFamily="34" charset="0"/>
+                        <a:cs typeface="Times New Roman" panose="02020603050405020304" pitchFamily="18" charset="0"/>
+                      </a:endParaRPr>
+                    </a:p>
+                  </a:txBody>
+                  <a:tcPr marL="68580" marR="68580" marT="0" marB="0"/>
+                </a:tc>
+                <a:tc>
+                  <a:txBody>
+                    <a:bodyPr/>
+                    <a:lstStyle/>
+                    <a:p>
+                      <a:pPr marL="0" marR="0">
+                        <a:lnSpc>
+                          <a:spcPct val="107000"/>
+                        </a:lnSpc>
+                        <a:spcBef>
+                          <a:spcPts val="0"/>
+                        </a:spcBef>
+                        <a:spcAft>
+                          <a:spcPts val="0"/>
+                        </a:spcAft>
+                      </a:pPr>
+                      <a:r>
+                        <a:rPr lang="bs-Latn-BA" sz="1300">
+                          <a:effectLst/>
+                        </a:rPr>
+                        <a:t>3</a:t>
+                      </a:r>
+                      <a:endParaRPr lang="en-US" sz="1100">
+                        <a:effectLst/>
+                        <a:latin typeface="Calibri" panose="020F0502020204030204" pitchFamily="34" charset="0"/>
+                        <a:ea typeface="Calibri" panose="020F0502020204030204" pitchFamily="34" charset="0"/>
+                        <a:cs typeface="Times New Roman" panose="02020603050405020304" pitchFamily="18" charset="0"/>
+                      </a:endParaRPr>
+                    </a:p>
+                  </a:txBody>
+                  <a:tcPr marL="68580" marR="68580" marT="0" marB="0"/>
+                </a:tc>
+              </a:tr>
+              <a:tr h="218343">
+                <a:tc>
+                  <a:txBody>
+                    <a:bodyPr/>
+                    <a:lstStyle/>
+                    <a:p>
+                      <a:pPr marL="0" marR="0">
+                        <a:lnSpc>
+                          <a:spcPct val="107000"/>
+                        </a:lnSpc>
+                        <a:spcBef>
+                          <a:spcPts val="0"/>
+                        </a:spcBef>
+                        <a:spcAft>
+                          <a:spcPts val="0"/>
+                        </a:spcAft>
+                      </a:pPr>
+                      <a:r>
+                        <a:rPr lang="bs-Latn-BA" sz="1300">
+                          <a:effectLst/>
+                        </a:rPr>
+                        <a:t>0.01</a:t>
+                      </a:r>
+                      <a:endParaRPr lang="en-US" sz="1100">
+                        <a:effectLst/>
+                        <a:latin typeface="Calibri" panose="020F0502020204030204" pitchFamily="34" charset="0"/>
+                        <a:ea typeface="Calibri" panose="020F0502020204030204" pitchFamily="34" charset="0"/>
+                        <a:cs typeface="Times New Roman" panose="02020603050405020304" pitchFamily="18" charset="0"/>
+                      </a:endParaRPr>
+                    </a:p>
+                  </a:txBody>
+                  <a:tcPr marL="68580" marR="68580" marT="0" marB="0"/>
+                </a:tc>
+                <a:tc>
+                  <a:txBody>
+                    <a:bodyPr/>
+                    <a:lstStyle/>
+                    <a:p>
+                      <a:pPr marL="0" marR="0">
+                        <a:lnSpc>
+                          <a:spcPct val="107000"/>
+                        </a:lnSpc>
+                        <a:spcBef>
+                          <a:spcPts val="0"/>
+                        </a:spcBef>
+                        <a:spcAft>
+                          <a:spcPts val="0"/>
+                        </a:spcAft>
+                      </a:pPr>
+                      <a:r>
+                        <a:rPr lang="bs-Latn-BA" sz="1300">
+                          <a:effectLst/>
+                        </a:rPr>
+                        <a:t>0.2</a:t>
+                      </a:r>
+                      <a:endParaRPr lang="en-US" sz="1100">
+                        <a:effectLst/>
+                        <a:latin typeface="Calibri" panose="020F0502020204030204" pitchFamily="34" charset="0"/>
+                        <a:ea typeface="Calibri" panose="020F0502020204030204" pitchFamily="34" charset="0"/>
+                        <a:cs typeface="Times New Roman" panose="02020603050405020304" pitchFamily="18" charset="0"/>
+                      </a:endParaRPr>
+                    </a:p>
+                  </a:txBody>
+                  <a:tcPr marL="68580" marR="68580" marT="0" marB="0"/>
+                </a:tc>
+                <a:tc>
+                  <a:txBody>
+                    <a:bodyPr/>
+                    <a:lstStyle/>
+                    <a:p>
+                      <a:pPr marL="0" marR="0">
+                        <a:lnSpc>
+                          <a:spcPct val="107000"/>
+                        </a:lnSpc>
+                        <a:spcBef>
+                          <a:spcPts val="0"/>
+                        </a:spcBef>
+                        <a:spcAft>
+                          <a:spcPts val="0"/>
+                        </a:spcAft>
+                      </a:pPr>
+                      <a:r>
+                        <a:rPr lang="bs-Latn-BA" sz="1300">
+                          <a:effectLst/>
+                        </a:rPr>
+                        <a:t>9.04</a:t>
+                      </a:r>
+                      <a:endParaRPr lang="en-US" sz="1100">
+                        <a:effectLst/>
+                        <a:latin typeface="Calibri" panose="020F0502020204030204" pitchFamily="34" charset="0"/>
+                        <a:ea typeface="Calibri" panose="020F0502020204030204" pitchFamily="34" charset="0"/>
+                        <a:cs typeface="Times New Roman" panose="02020603050405020304" pitchFamily="18" charset="0"/>
+                      </a:endParaRPr>
+                    </a:p>
+                  </a:txBody>
+                  <a:tcPr marL="68580" marR="68580" marT="0" marB="0"/>
+                </a:tc>
+                <a:tc>
+                  <a:txBody>
+                    <a:bodyPr/>
+                    <a:lstStyle/>
+                    <a:p>
+                      <a:pPr marL="0" marR="0">
+                        <a:lnSpc>
+                          <a:spcPct val="107000"/>
+                        </a:lnSpc>
+                        <a:spcBef>
+                          <a:spcPts val="0"/>
+                        </a:spcBef>
+                        <a:spcAft>
+                          <a:spcPts val="0"/>
+                        </a:spcAft>
+                      </a:pPr>
+                      <a:r>
+                        <a:rPr lang="bs-Latn-BA" sz="1300">
+                          <a:effectLst/>
+                        </a:rPr>
+                        <a:t>2</a:t>
+                      </a:r>
+                      <a:endParaRPr lang="en-US" sz="1100">
+                        <a:effectLst/>
+                        <a:latin typeface="Calibri" panose="020F0502020204030204" pitchFamily="34" charset="0"/>
+                        <a:ea typeface="Calibri" panose="020F0502020204030204" pitchFamily="34" charset="0"/>
+                        <a:cs typeface="Times New Roman" panose="02020603050405020304" pitchFamily="18" charset="0"/>
+                      </a:endParaRPr>
+                    </a:p>
+                  </a:txBody>
+                  <a:tcPr marL="68580" marR="68580" marT="0" marB="0"/>
+                </a:tc>
+              </a:tr>
+              <a:tr h="218343">
+                <a:tc>
+                  <a:txBody>
+                    <a:bodyPr/>
+                    <a:lstStyle/>
+                    <a:p>
+                      <a:pPr marL="0" marR="0">
+                        <a:lnSpc>
+                          <a:spcPct val="107000"/>
+                        </a:lnSpc>
+                        <a:spcBef>
+                          <a:spcPts val="0"/>
+                        </a:spcBef>
+                        <a:spcAft>
+                          <a:spcPts val="0"/>
+                        </a:spcAft>
+                      </a:pPr>
+                      <a:r>
+                        <a:rPr lang="bs-Latn-BA" sz="1300">
+                          <a:effectLst/>
+                        </a:rPr>
+                        <a:t>0.1</a:t>
+                      </a:r>
+                      <a:endParaRPr lang="en-US" sz="1100">
+                        <a:effectLst/>
+                        <a:latin typeface="Calibri" panose="020F0502020204030204" pitchFamily="34" charset="0"/>
+                        <a:ea typeface="Calibri" panose="020F0502020204030204" pitchFamily="34" charset="0"/>
+                        <a:cs typeface="Times New Roman" panose="02020603050405020304" pitchFamily="18" charset="0"/>
+                      </a:endParaRPr>
+                    </a:p>
+                  </a:txBody>
+                  <a:tcPr marL="68580" marR="68580" marT="0" marB="0"/>
+                </a:tc>
+                <a:tc>
+                  <a:txBody>
+                    <a:bodyPr/>
+                    <a:lstStyle/>
+                    <a:p>
+                      <a:pPr marL="0" marR="0">
+                        <a:lnSpc>
+                          <a:spcPct val="107000"/>
+                        </a:lnSpc>
+                        <a:spcBef>
+                          <a:spcPts val="0"/>
+                        </a:spcBef>
+                        <a:spcAft>
+                          <a:spcPts val="0"/>
+                        </a:spcAft>
+                      </a:pPr>
+                      <a:r>
+                        <a:rPr lang="bs-Latn-BA" sz="1300">
+                          <a:effectLst/>
+                        </a:rPr>
+                        <a:t>0.4</a:t>
+                      </a:r>
+                      <a:endParaRPr lang="en-US" sz="1100">
+                        <a:effectLst/>
+                        <a:latin typeface="Calibri" panose="020F0502020204030204" pitchFamily="34" charset="0"/>
+                        <a:ea typeface="Calibri" panose="020F0502020204030204" pitchFamily="34" charset="0"/>
+                        <a:cs typeface="Times New Roman" panose="02020603050405020304" pitchFamily="18" charset="0"/>
+                      </a:endParaRPr>
+                    </a:p>
+                  </a:txBody>
+                  <a:tcPr marL="68580" marR="68580" marT="0" marB="0"/>
+                </a:tc>
+                <a:tc>
+                  <a:txBody>
+                    <a:bodyPr/>
+                    <a:lstStyle/>
+                    <a:p>
+                      <a:pPr marL="0" marR="0">
+                        <a:lnSpc>
+                          <a:spcPct val="107000"/>
+                        </a:lnSpc>
+                        <a:spcBef>
+                          <a:spcPts val="0"/>
+                        </a:spcBef>
+                        <a:spcAft>
+                          <a:spcPts val="0"/>
+                        </a:spcAft>
+                      </a:pPr>
+                      <a:r>
+                        <a:rPr lang="bs-Latn-BA" sz="1300">
+                          <a:effectLst/>
+                        </a:rPr>
+                        <a:t>7.16</a:t>
+                      </a:r>
+                      <a:endParaRPr lang="en-US" sz="1100">
+                        <a:effectLst/>
+                        <a:latin typeface="Calibri" panose="020F0502020204030204" pitchFamily="34" charset="0"/>
+                        <a:ea typeface="Calibri" panose="020F0502020204030204" pitchFamily="34" charset="0"/>
+                        <a:cs typeface="Times New Roman" panose="02020603050405020304" pitchFamily="18" charset="0"/>
+                      </a:endParaRPr>
+                    </a:p>
+                  </a:txBody>
+                  <a:tcPr marL="68580" marR="68580" marT="0" marB="0"/>
+                </a:tc>
+                <a:tc>
+                  <a:txBody>
+                    <a:bodyPr/>
+                    <a:lstStyle/>
+                    <a:p>
+                      <a:pPr marL="0" marR="0">
+                        <a:lnSpc>
+                          <a:spcPct val="107000"/>
+                        </a:lnSpc>
+                        <a:spcBef>
+                          <a:spcPts val="0"/>
+                        </a:spcBef>
+                        <a:spcAft>
+                          <a:spcPts val="0"/>
+                        </a:spcAft>
+                      </a:pPr>
+                      <a:r>
+                        <a:rPr lang="bs-Latn-BA" sz="1300">
+                          <a:effectLst/>
+                        </a:rPr>
+                        <a:t>2</a:t>
+                      </a:r>
+                      <a:endParaRPr lang="en-US" sz="1100">
+                        <a:effectLst/>
+                        <a:latin typeface="Calibri" panose="020F0502020204030204" pitchFamily="34" charset="0"/>
+                        <a:ea typeface="Calibri" panose="020F0502020204030204" pitchFamily="34" charset="0"/>
+                        <a:cs typeface="Times New Roman" panose="02020603050405020304" pitchFamily="18" charset="0"/>
+                      </a:endParaRPr>
+                    </a:p>
+                  </a:txBody>
+                  <a:tcPr marL="68580" marR="68580" marT="0" marB="0"/>
+                </a:tc>
+              </a:tr>
+              <a:tr h="218343">
+                <a:tc>
+                  <a:txBody>
+                    <a:bodyPr/>
+                    <a:lstStyle/>
+                    <a:p>
+                      <a:pPr marL="0" marR="0">
+                        <a:lnSpc>
+                          <a:spcPct val="107000"/>
+                        </a:lnSpc>
+                        <a:spcBef>
+                          <a:spcPts val="0"/>
+                        </a:spcBef>
+                        <a:spcAft>
+                          <a:spcPts val="0"/>
+                        </a:spcAft>
+                      </a:pPr>
+                      <a:r>
+                        <a:rPr lang="bs-Latn-BA" sz="1300">
+                          <a:effectLst/>
+                        </a:rPr>
+                        <a:t>0.01</a:t>
+                      </a:r>
+                      <a:endParaRPr lang="en-US" sz="1100">
+                        <a:effectLst/>
+                        <a:latin typeface="Calibri" panose="020F0502020204030204" pitchFamily="34" charset="0"/>
+                        <a:ea typeface="Calibri" panose="020F0502020204030204" pitchFamily="34" charset="0"/>
+                        <a:cs typeface="Times New Roman" panose="02020603050405020304" pitchFamily="18" charset="0"/>
+                      </a:endParaRPr>
+                    </a:p>
+                  </a:txBody>
+                  <a:tcPr marL="68580" marR="68580" marT="0" marB="0"/>
+                </a:tc>
+                <a:tc>
+                  <a:txBody>
+                    <a:bodyPr/>
+                    <a:lstStyle/>
+                    <a:p>
+                      <a:pPr marL="0" marR="0">
+                        <a:lnSpc>
+                          <a:spcPct val="107000"/>
+                        </a:lnSpc>
+                        <a:spcBef>
+                          <a:spcPts val="0"/>
+                        </a:spcBef>
+                        <a:spcAft>
+                          <a:spcPts val="0"/>
+                        </a:spcAft>
+                      </a:pPr>
+                      <a:r>
+                        <a:rPr lang="bs-Latn-BA" sz="1300">
+                          <a:effectLst/>
+                        </a:rPr>
+                        <a:t>0.4</a:t>
+                      </a:r>
+                      <a:endParaRPr lang="en-US" sz="1100">
+                        <a:effectLst/>
+                        <a:latin typeface="Calibri" panose="020F0502020204030204" pitchFamily="34" charset="0"/>
+                        <a:ea typeface="Calibri" panose="020F0502020204030204" pitchFamily="34" charset="0"/>
+                        <a:cs typeface="Times New Roman" panose="02020603050405020304" pitchFamily="18" charset="0"/>
+                      </a:endParaRPr>
+                    </a:p>
+                  </a:txBody>
+                  <a:tcPr marL="68580" marR="68580" marT="0" marB="0"/>
+                </a:tc>
+                <a:tc>
+                  <a:txBody>
+                    <a:bodyPr/>
+                    <a:lstStyle/>
+                    <a:p>
+                      <a:pPr marL="0" marR="0">
+                        <a:lnSpc>
+                          <a:spcPct val="107000"/>
+                        </a:lnSpc>
+                        <a:spcBef>
+                          <a:spcPts val="0"/>
+                        </a:spcBef>
+                        <a:spcAft>
+                          <a:spcPts val="0"/>
+                        </a:spcAft>
+                      </a:pPr>
+                      <a:r>
+                        <a:rPr lang="bs-Latn-BA" sz="1300">
+                          <a:effectLst/>
+                        </a:rPr>
+                        <a:t>7.89</a:t>
+                      </a:r>
+                      <a:endParaRPr lang="en-US" sz="1100">
+                        <a:effectLst/>
+                        <a:latin typeface="Calibri" panose="020F0502020204030204" pitchFamily="34" charset="0"/>
+                        <a:ea typeface="Calibri" panose="020F0502020204030204" pitchFamily="34" charset="0"/>
+                        <a:cs typeface="Times New Roman" panose="02020603050405020304" pitchFamily="18" charset="0"/>
+                      </a:endParaRPr>
+                    </a:p>
+                  </a:txBody>
+                  <a:tcPr marL="68580" marR="68580" marT="0" marB="0"/>
+                </a:tc>
+                <a:tc>
+                  <a:txBody>
+                    <a:bodyPr/>
+                    <a:lstStyle/>
+                    <a:p>
+                      <a:pPr marL="0" marR="0">
+                        <a:lnSpc>
+                          <a:spcPct val="107000"/>
+                        </a:lnSpc>
+                        <a:spcBef>
+                          <a:spcPts val="0"/>
+                        </a:spcBef>
+                        <a:spcAft>
+                          <a:spcPts val="0"/>
+                        </a:spcAft>
+                      </a:pPr>
+                      <a:r>
+                        <a:rPr lang="bs-Latn-BA" sz="1300">
+                          <a:effectLst/>
+                        </a:rPr>
+                        <a:t>3</a:t>
+                      </a:r>
+                      <a:endParaRPr lang="en-US" sz="1100">
+                        <a:effectLst/>
+                        <a:latin typeface="Calibri" panose="020F0502020204030204" pitchFamily="34" charset="0"/>
+                        <a:ea typeface="Calibri" panose="020F0502020204030204" pitchFamily="34" charset="0"/>
+                        <a:cs typeface="Times New Roman" panose="02020603050405020304" pitchFamily="18" charset="0"/>
+                      </a:endParaRPr>
+                    </a:p>
+                  </a:txBody>
+                  <a:tcPr marL="68580" marR="68580" marT="0" marB="0"/>
+                </a:tc>
+              </a:tr>
+            </a:tbl>
+          </a:graphicData>
+        </a:graphic>
+      </p:graphicFrame>
     </p:spTree>
     <p:extLst>
       <p:ext uri="{BB962C8B-B14F-4D97-AF65-F5344CB8AC3E}">
-        <p14:creationId xmlns:p14="http://schemas.microsoft.com/office/powerpoint/2010/main" val="503888442"/>
+        <p14:creationId xmlns:p14="http://schemas.microsoft.com/office/powerpoint/2010/main" val="56841531"/>
       </p:ext>
     </p:extLst>
   </p:cSld>
@@ -4081,192 +4948,1005 @@
             </a:r>
           </a:p>
           <a:p>
+            <a:pPr marL="0" indent="0">
+              <a:buNone/>
+            </a:pPr>
             <a:r>
               <a:rPr lang="en-US" sz="2000" smtClean="0"/>
-              <a:t>Kada sam koristio evaluaciju </a:t>
+              <a:t>“</a:t>
             </a:r>
             <a:r>
               <a:rPr lang="bs-Latn-BA" sz="2000" smtClean="0"/>
-              <a:t>rastojanja </a:t>
+              <a:t>Jedan </a:t>
+            </a:r>
+            <a:r>
+              <a:rPr lang="bs-Latn-BA" sz="2000"/>
+              <a:t>način na koji je probano poboljšanje eksperimentisanja generacije je u ukrštanju jedinki. Umjesto da popunjavamo potomke jedinki sa instrukcijama </a:t>
+            </a:r>
+            <a:r>
+              <a:rPr lang="bs-Latn-BA" sz="2000" i="1"/>
+              <a:t>donor </a:t>
+            </a:r>
+            <a:r>
+              <a:rPr lang="bs-Latn-BA" sz="2000"/>
+              <a:t>roditelja možemo da pustimo potomak da pronađe svoj put ka cilju. Za ovaj slučaj ukrštanja smo imali </a:t>
+            </a:r>
+            <a:r>
+              <a:rPr lang="bs-Latn-BA" sz="2000"/>
+              <a:t>sledeća </a:t>
+            </a:r>
+            <a:r>
+              <a:rPr lang="bs-Latn-BA" sz="2000" smtClean="0"/>
+              <a:t>rješenja</a:t>
             </a:r>
             <a:r>
               <a:rPr lang="en-US" sz="2000" smtClean="0"/>
-              <a:t>svakog polja </a:t>
-            </a:r>
-            <a:r>
-              <a:rPr lang="bs-Latn-BA" sz="2000" smtClean="0"/>
-              <a:t>u lavirintu do krajnje pozicije </a:t>
-            </a:r>
-            <a:r>
-              <a:rPr lang="en-US" sz="2000" smtClean="0"/>
-              <a:t>umjest</a:t>
-            </a:r>
-            <a:r>
-              <a:rPr lang="bs-Latn-BA" sz="2000" smtClean="0"/>
-              <a:t>o</a:t>
-            </a:r>
-            <a:r>
-              <a:rPr lang="en-US" sz="2000" smtClean="0"/>
-              <a:t> obi</a:t>
-            </a:r>
-            <a:r>
-              <a:rPr lang="bs-Latn-BA" sz="2000"/>
-              <a:t>č</a:t>
-            </a:r>
-            <a:r>
-              <a:rPr lang="en-US" sz="2000" smtClean="0"/>
-              <a:t>n</a:t>
-            </a:r>
-            <a:r>
-              <a:rPr lang="bs-Latn-BA" sz="2000" smtClean="0"/>
-              <a:t>e</a:t>
-            </a:r>
-            <a:r>
-              <a:rPr lang="en-US" sz="2000" smtClean="0"/>
-              <a:t> evaluacij</a:t>
-            </a:r>
-            <a:r>
-              <a:rPr lang="bs-Latn-BA" sz="2000" smtClean="0"/>
-              <a:t>e</a:t>
-            </a:r>
-            <a:r>
-              <a:rPr lang="en-US" sz="2000" smtClean="0"/>
-              <a:t> rastojanja trenutne pozicije od krajnje dobio sam rezultate:</a:t>
-            </a:r>
+              <a:t>”</a:t>
+            </a:r>
+            <a:endParaRPr lang="en-US" sz="2000"/>
           </a:p>
           <a:p>
             <a:pPr marL="0" indent="0">
               <a:buNone/>
             </a:pPr>
-            <a:r>
-              <a:rPr lang="en-US" sz="1100" smtClean="0"/>
-              <a:t>test id=0; seed=42; num of generations=42; fitness=0</a:t>
-            </a:r>
+            <a:endParaRPr lang="en-US" sz="2000" smtClean="0"/>
           </a:p>
           <a:p>
             <a:pPr marL="0" indent="0">
               <a:buNone/>
             </a:pPr>
-            <a:r>
-              <a:rPr lang="en-US" sz="1100" smtClean="0"/>
-              <a:t>test id=1; seed=43; num of generations=50; fitness=0</a:t>
-            </a:r>
-          </a:p>
-          <a:p>
-            <a:pPr marL="0" indent="0">
-              <a:buNone/>
-            </a:pPr>
-            <a:r>
-              <a:rPr lang="en-US" sz="1100" smtClean="0"/>
-              <a:t>test id=2; seed=44; num of generations=39; fitness=0</a:t>
-            </a:r>
-          </a:p>
-          <a:p>
-            <a:pPr marL="0" indent="0">
-              <a:buNone/>
-            </a:pPr>
-            <a:r>
-              <a:rPr lang="en-US" sz="1100" smtClean="0"/>
-              <a:t>test id=3; seed=45; num of generations=26; fitness=0</a:t>
-            </a:r>
-          </a:p>
-          <a:p>
-            <a:pPr marL="0" indent="0">
-              <a:buNone/>
-            </a:pPr>
-            <a:r>
-              <a:rPr lang="en-US" sz="1100" smtClean="0"/>
-              <a:t>test id=4; seed=46; num of generations=51; fitness=18</a:t>
-            </a:r>
-          </a:p>
-          <a:p>
-            <a:pPr marL="0" indent="0">
-              <a:buNone/>
-            </a:pPr>
-            <a:r>
-              <a:rPr lang="en-US" sz="1100" smtClean="0"/>
-              <a:t>test id=5; seed=47; num of generations=51; fitness=24</a:t>
-            </a:r>
-          </a:p>
-          <a:p>
-            <a:pPr marL="0" indent="0">
-              <a:buNone/>
-            </a:pPr>
-            <a:r>
-              <a:rPr lang="en-US" sz="1100" smtClean="0"/>
-              <a:t>test id=6; seed=48; num of generations=49; fitness=0</a:t>
-            </a:r>
-          </a:p>
-          <a:p>
-            <a:pPr marL="0" indent="0">
-              <a:buNone/>
-            </a:pPr>
-            <a:r>
-              <a:rPr lang="en-US" sz="1100" smtClean="0"/>
-              <a:t>test id=7; seed=49; num of generations=40; fitness=0</a:t>
-            </a:r>
-          </a:p>
-          <a:p>
-            <a:pPr marL="0" indent="0">
-              <a:buNone/>
-            </a:pPr>
-            <a:r>
-              <a:rPr lang="en-US" sz="1100" smtClean="0"/>
-              <a:t>test id=8; seed=50; num of generations=51; fitness=28</a:t>
-            </a:r>
-          </a:p>
-          <a:p>
-            <a:pPr marL="0" indent="0">
-              <a:buNone/>
-            </a:pPr>
-            <a:r>
-              <a:rPr lang="en-US" sz="1100" smtClean="0"/>
-              <a:t>test id=9; seed=51; num of generations=27; fitness=0</a:t>
-            </a:r>
-          </a:p>
-          <a:p>
-            <a:pPr marL="0" indent="0">
-              <a:buNone/>
-            </a:pPr>
-            <a:r>
-              <a:rPr lang="en-US" sz="1100" smtClean="0"/>
-              <a:t>test id=10; seed=52; num of generations=37; fitness=0</a:t>
-            </a:r>
-          </a:p>
-          <a:p>
-            <a:pPr marL="0" indent="0">
-              <a:buNone/>
-            </a:pPr>
-            <a:r>
-              <a:rPr lang="en-US" sz="1600" b="1" smtClean="0"/>
-              <a:t>AVG</a:t>
-            </a:r>
-            <a:r>
-              <a:rPr lang="en-US" sz="1600" smtClean="0"/>
-              <a:t>= 70/ 11 = </a:t>
-            </a:r>
-            <a:r>
-              <a:rPr lang="en-US" sz="1600" b="1" smtClean="0"/>
-              <a:t>6.363</a:t>
-            </a:r>
-            <a:endParaRPr lang="en-US" sz="1600" smtClean="0"/>
-          </a:p>
-          <a:p>
-            <a:pPr marL="0" indent="0">
-              <a:buNone/>
-            </a:pPr>
-            <a:r>
-              <a:rPr lang="en-US" sz="2000" smtClean="0"/>
-              <a:t>Od 11 testova. Za 3 testa nisu nadjena rjesenja za 50 generacija</a:t>
-            </a:r>
-            <a:endParaRPr lang="bs-Latn-BA" sz="2000" smtClean="0"/>
-          </a:p>
-        </p:txBody>
-      </p:sp>
+            <a:endParaRPr lang="bs-Latn-BA" sz="1100" smtClean="0"/>
+          </a:p>
+        </p:txBody>
+      </p:sp>
+      <p:graphicFrame>
+        <p:nvGraphicFramePr>
+          <p:cNvPr id="5" name="Table 4"/>
+          <p:cNvGraphicFramePr>
+            <a:graphicFrameLocks noGrp="1"/>
+          </p:cNvGraphicFramePr>
+          <p:nvPr>
+            <p:extLst>
+              <p:ext uri="{D42A27DB-BD31-4B8C-83A1-F6EECF244321}">
+                <p14:modId xmlns:p14="http://schemas.microsoft.com/office/powerpoint/2010/main" val="1906299569"/>
+              </p:ext>
+            </p:extLst>
+          </p:nvPr>
+        </p:nvGraphicFramePr>
+        <p:xfrm>
+          <a:off x="320039" y="3140004"/>
+          <a:ext cx="6347462" cy="2681674"/>
+        </p:xfrm>
+        <a:graphic>
+          <a:graphicData uri="http://schemas.openxmlformats.org/drawingml/2006/table">
+            <a:tbl>
+              <a:tblPr firstRow="1" firstCol="1" bandRow="1">
+                <a:tableStyleId>{5C22544A-7EE6-4342-B048-85BDC9FD1C3A}</a:tableStyleId>
+              </a:tblPr>
+              <a:tblGrid>
+                <a:gridCol w="1586526"/>
+                <a:gridCol w="1586526"/>
+                <a:gridCol w="1587205"/>
+                <a:gridCol w="1587205"/>
+              </a:tblGrid>
+              <a:tr h="606352">
+                <a:tc>
+                  <a:txBody>
+                    <a:bodyPr/>
+                    <a:lstStyle/>
+                    <a:p>
+                      <a:pPr marL="0" marR="0">
+                        <a:lnSpc>
+                          <a:spcPct val="107000"/>
+                        </a:lnSpc>
+                        <a:spcBef>
+                          <a:spcPts val="0"/>
+                        </a:spcBef>
+                        <a:spcAft>
+                          <a:spcPts val="0"/>
+                        </a:spcAft>
+                      </a:pPr>
+                      <a:r>
+                        <a:rPr lang="bs-Latn-BA" sz="1300">
+                          <a:effectLst/>
+                        </a:rPr>
+                        <a:t>Stopa mutacije</a:t>
+                      </a:r>
+                      <a:endParaRPr lang="en-US" sz="1100">
+                        <a:effectLst/>
+                        <a:latin typeface="Calibri" panose="020F0502020204030204" pitchFamily="34" charset="0"/>
+                        <a:ea typeface="Calibri" panose="020F0502020204030204" pitchFamily="34" charset="0"/>
+                        <a:cs typeface="Times New Roman" panose="02020603050405020304" pitchFamily="18" charset="0"/>
+                      </a:endParaRPr>
+                    </a:p>
+                  </a:txBody>
+                  <a:tcPr marL="68580" marR="68580" marT="0" marB="0"/>
+                </a:tc>
+                <a:tc>
+                  <a:txBody>
+                    <a:bodyPr/>
+                    <a:lstStyle/>
+                    <a:p>
+                      <a:pPr marL="0" marR="0">
+                        <a:lnSpc>
+                          <a:spcPct val="107000"/>
+                        </a:lnSpc>
+                        <a:spcBef>
+                          <a:spcPts val="0"/>
+                        </a:spcBef>
+                        <a:spcAft>
+                          <a:spcPts val="0"/>
+                        </a:spcAft>
+                      </a:pPr>
+                      <a:r>
+                        <a:rPr lang="bs-Latn-BA" sz="1300">
+                          <a:effectLst/>
+                        </a:rPr>
+                        <a:t>Stopa elitizma</a:t>
+                      </a:r>
+                      <a:endParaRPr lang="en-US" sz="1100">
+                        <a:effectLst/>
+                        <a:latin typeface="Calibri" panose="020F0502020204030204" pitchFamily="34" charset="0"/>
+                        <a:ea typeface="Calibri" panose="020F0502020204030204" pitchFamily="34" charset="0"/>
+                        <a:cs typeface="Times New Roman" panose="02020603050405020304" pitchFamily="18" charset="0"/>
+                      </a:endParaRPr>
+                    </a:p>
+                  </a:txBody>
+                  <a:tcPr marL="68580" marR="68580" marT="0" marB="0"/>
+                </a:tc>
+                <a:tc>
+                  <a:txBody>
+                    <a:bodyPr/>
+                    <a:lstStyle/>
+                    <a:p>
+                      <a:pPr marL="0" marR="0">
+                        <a:lnSpc>
+                          <a:spcPct val="107000"/>
+                        </a:lnSpc>
+                        <a:spcBef>
+                          <a:spcPts val="0"/>
+                        </a:spcBef>
+                        <a:spcAft>
+                          <a:spcPts val="0"/>
+                        </a:spcAft>
+                      </a:pPr>
+                      <a:r>
+                        <a:rPr lang="bs-Latn-BA" sz="1300">
+                          <a:effectLst/>
+                        </a:rPr>
+                        <a:t>Prosječna evaluacija</a:t>
+                      </a:r>
+                      <a:endParaRPr lang="en-US" sz="1100">
+                        <a:effectLst/>
+                        <a:latin typeface="Calibri" panose="020F0502020204030204" pitchFamily="34" charset="0"/>
+                        <a:ea typeface="Calibri" panose="020F0502020204030204" pitchFamily="34" charset="0"/>
+                        <a:cs typeface="Times New Roman" panose="02020603050405020304" pitchFamily="18" charset="0"/>
+                      </a:endParaRPr>
+                    </a:p>
+                  </a:txBody>
+                  <a:tcPr marL="68580" marR="68580" marT="0" marB="0"/>
+                </a:tc>
+                <a:tc>
+                  <a:txBody>
+                    <a:bodyPr/>
+                    <a:lstStyle/>
+                    <a:p>
+                      <a:pPr marL="0" marR="0">
+                        <a:lnSpc>
+                          <a:spcPct val="107000"/>
+                        </a:lnSpc>
+                        <a:spcBef>
+                          <a:spcPts val="0"/>
+                        </a:spcBef>
+                        <a:spcAft>
+                          <a:spcPts val="0"/>
+                        </a:spcAft>
+                      </a:pPr>
+                      <a:r>
+                        <a:rPr lang="bs-Latn-BA" sz="1300">
+                          <a:effectLst/>
+                        </a:rPr>
+                        <a:t>Broj riješenih problema od 11</a:t>
+                      </a:r>
+                      <a:endParaRPr lang="en-US" sz="1100">
+                        <a:effectLst/>
+                        <a:latin typeface="Calibri" panose="020F0502020204030204" pitchFamily="34" charset="0"/>
+                        <a:ea typeface="Calibri" panose="020F0502020204030204" pitchFamily="34" charset="0"/>
+                        <a:cs typeface="Times New Roman" panose="02020603050405020304" pitchFamily="18" charset="0"/>
+                      </a:endParaRPr>
+                    </a:p>
+                  </a:txBody>
+                  <a:tcPr marL="68580" marR="68580" marT="0" marB="0"/>
+                </a:tc>
+              </a:tr>
+              <a:tr h="345887">
+                <a:tc>
+                  <a:txBody>
+                    <a:bodyPr/>
+                    <a:lstStyle/>
+                    <a:p>
+                      <a:pPr marL="0" marR="0">
+                        <a:lnSpc>
+                          <a:spcPct val="107000"/>
+                        </a:lnSpc>
+                        <a:spcBef>
+                          <a:spcPts val="0"/>
+                        </a:spcBef>
+                        <a:spcAft>
+                          <a:spcPts val="0"/>
+                        </a:spcAft>
+                      </a:pPr>
+                      <a:r>
+                        <a:rPr lang="bs-Latn-BA" sz="1300">
+                          <a:effectLst/>
+                        </a:rPr>
+                        <a:t>0.1</a:t>
+                      </a:r>
+                      <a:endParaRPr lang="en-US" sz="1100">
+                        <a:effectLst/>
+                        <a:latin typeface="Calibri" panose="020F0502020204030204" pitchFamily="34" charset="0"/>
+                        <a:ea typeface="Calibri" panose="020F0502020204030204" pitchFamily="34" charset="0"/>
+                        <a:cs typeface="Times New Roman" panose="02020603050405020304" pitchFamily="18" charset="0"/>
+                      </a:endParaRPr>
+                    </a:p>
+                  </a:txBody>
+                  <a:tcPr marL="68580" marR="68580" marT="0" marB="0"/>
+                </a:tc>
+                <a:tc>
+                  <a:txBody>
+                    <a:bodyPr/>
+                    <a:lstStyle/>
+                    <a:p>
+                      <a:pPr marL="0" marR="0">
+                        <a:lnSpc>
+                          <a:spcPct val="107000"/>
+                        </a:lnSpc>
+                        <a:spcBef>
+                          <a:spcPts val="0"/>
+                        </a:spcBef>
+                        <a:spcAft>
+                          <a:spcPts val="0"/>
+                        </a:spcAft>
+                      </a:pPr>
+                      <a:r>
+                        <a:rPr lang="bs-Latn-BA" sz="1300">
+                          <a:effectLst/>
+                        </a:rPr>
+                        <a:t>0.0</a:t>
+                      </a:r>
+                      <a:endParaRPr lang="en-US" sz="1100">
+                        <a:effectLst/>
+                        <a:latin typeface="Calibri" panose="020F0502020204030204" pitchFamily="34" charset="0"/>
+                        <a:ea typeface="Calibri" panose="020F0502020204030204" pitchFamily="34" charset="0"/>
+                        <a:cs typeface="Times New Roman" panose="02020603050405020304" pitchFamily="18" charset="0"/>
+                      </a:endParaRPr>
+                    </a:p>
+                  </a:txBody>
+                  <a:tcPr marL="68580" marR="68580" marT="0" marB="0"/>
+                </a:tc>
+                <a:tc>
+                  <a:txBody>
+                    <a:bodyPr/>
+                    <a:lstStyle/>
+                    <a:p>
+                      <a:pPr marL="0" marR="0">
+                        <a:lnSpc>
+                          <a:spcPct val="107000"/>
+                        </a:lnSpc>
+                        <a:spcBef>
+                          <a:spcPts val="0"/>
+                        </a:spcBef>
+                        <a:spcAft>
+                          <a:spcPts val="0"/>
+                        </a:spcAft>
+                      </a:pPr>
+                      <a:r>
+                        <a:rPr lang="bs-Latn-BA" sz="1300">
+                          <a:effectLst/>
+                        </a:rPr>
+                        <a:t>19.46</a:t>
+                      </a:r>
+                      <a:endParaRPr lang="en-US" sz="1100">
+                        <a:effectLst/>
+                        <a:latin typeface="Calibri" panose="020F0502020204030204" pitchFamily="34" charset="0"/>
+                        <a:ea typeface="Calibri" panose="020F0502020204030204" pitchFamily="34" charset="0"/>
+                        <a:cs typeface="Times New Roman" panose="02020603050405020304" pitchFamily="18" charset="0"/>
+                      </a:endParaRPr>
+                    </a:p>
+                  </a:txBody>
+                  <a:tcPr marL="68580" marR="68580" marT="0" marB="0"/>
+                </a:tc>
+                <a:tc>
+                  <a:txBody>
+                    <a:bodyPr/>
+                    <a:lstStyle/>
+                    <a:p>
+                      <a:pPr marL="0" marR="0">
+                        <a:lnSpc>
+                          <a:spcPct val="107000"/>
+                        </a:lnSpc>
+                        <a:spcBef>
+                          <a:spcPts val="0"/>
+                        </a:spcBef>
+                        <a:spcAft>
+                          <a:spcPts val="0"/>
+                        </a:spcAft>
+                      </a:pPr>
+                      <a:r>
+                        <a:rPr lang="bs-Latn-BA" sz="1300">
+                          <a:effectLst/>
+                        </a:rPr>
+                        <a:t>1</a:t>
+                      </a:r>
+                      <a:endParaRPr lang="en-US" sz="1100">
+                        <a:effectLst/>
+                        <a:latin typeface="Calibri" panose="020F0502020204030204" pitchFamily="34" charset="0"/>
+                        <a:ea typeface="Calibri" panose="020F0502020204030204" pitchFamily="34" charset="0"/>
+                        <a:cs typeface="Times New Roman" panose="02020603050405020304" pitchFamily="18" charset="0"/>
+                      </a:endParaRPr>
+                    </a:p>
+                  </a:txBody>
+                  <a:tcPr marL="68580" marR="68580" marT="0" marB="0"/>
+                </a:tc>
+              </a:tr>
+              <a:tr h="345887">
+                <a:tc>
+                  <a:txBody>
+                    <a:bodyPr/>
+                    <a:lstStyle/>
+                    <a:p>
+                      <a:pPr marL="0" marR="0">
+                        <a:lnSpc>
+                          <a:spcPct val="107000"/>
+                        </a:lnSpc>
+                        <a:spcBef>
+                          <a:spcPts val="0"/>
+                        </a:spcBef>
+                        <a:spcAft>
+                          <a:spcPts val="0"/>
+                        </a:spcAft>
+                      </a:pPr>
+                      <a:r>
+                        <a:rPr lang="bs-Latn-BA" sz="1300">
+                          <a:effectLst/>
+                        </a:rPr>
+                        <a:t>0.1</a:t>
+                      </a:r>
+                      <a:endParaRPr lang="en-US" sz="1100">
+                        <a:effectLst/>
+                        <a:latin typeface="Calibri" panose="020F0502020204030204" pitchFamily="34" charset="0"/>
+                        <a:ea typeface="Calibri" panose="020F0502020204030204" pitchFamily="34" charset="0"/>
+                        <a:cs typeface="Times New Roman" panose="02020603050405020304" pitchFamily="18" charset="0"/>
+                      </a:endParaRPr>
+                    </a:p>
+                  </a:txBody>
+                  <a:tcPr marL="68580" marR="68580" marT="0" marB="0"/>
+                </a:tc>
+                <a:tc>
+                  <a:txBody>
+                    <a:bodyPr/>
+                    <a:lstStyle/>
+                    <a:p>
+                      <a:pPr marL="0" marR="0">
+                        <a:lnSpc>
+                          <a:spcPct val="107000"/>
+                        </a:lnSpc>
+                        <a:spcBef>
+                          <a:spcPts val="0"/>
+                        </a:spcBef>
+                        <a:spcAft>
+                          <a:spcPts val="0"/>
+                        </a:spcAft>
+                      </a:pPr>
+                      <a:r>
+                        <a:rPr lang="bs-Latn-BA" sz="1300">
+                          <a:effectLst/>
+                        </a:rPr>
+                        <a:t>0.2</a:t>
+                      </a:r>
+                      <a:endParaRPr lang="en-US" sz="1100">
+                        <a:effectLst/>
+                        <a:latin typeface="Calibri" panose="020F0502020204030204" pitchFamily="34" charset="0"/>
+                        <a:ea typeface="Calibri" panose="020F0502020204030204" pitchFamily="34" charset="0"/>
+                        <a:cs typeface="Times New Roman" panose="02020603050405020304" pitchFamily="18" charset="0"/>
+                      </a:endParaRPr>
+                    </a:p>
+                  </a:txBody>
+                  <a:tcPr marL="68580" marR="68580" marT="0" marB="0"/>
+                </a:tc>
+                <a:tc>
+                  <a:txBody>
+                    <a:bodyPr/>
+                    <a:lstStyle/>
+                    <a:p>
+                      <a:pPr marL="0" marR="0">
+                        <a:lnSpc>
+                          <a:spcPct val="107000"/>
+                        </a:lnSpc>
+                        <a:spcBef>
+                          <a:spcPts val="0"/>
+                        </a:spcBef>
+                        <a:spcAft>
+                          <a:spcPts val="0"/>
+                        </a:spcAft>
+                      </a:pPr>
+                      <a:r>
+                        <a:rPr lang="bs-Latn-BA" sz="1300">
+                          <a:effectLst/>
+                        </a:rPr>
+                        <a:t>6.98</a:t>
+                      </a:r>
+                      <a:endParaRPr lang="en-US" sz="1100">
+                        <a:effectLst/>
+                        <a:latin typeface="Calibri" panose="020F0502020204030204" pitchFamily="34" charset="0"/>
+                        <a:ea typeface="Calibri" panose="020F0502020204030204" pitchFamily="34" charset="0"/>
+                        <a:cs typeface="Times New Roman" panose="02020603050405020304" pitchFamily="18" charset="0"/>
+                      </a:endParaRPr>
+                    </a:p>
+                  </a:txBody>
+                  <a:tcPr marL="68580" marR="68580" marT="0" marB="0"/>
+                </a:tc>
+                <a:tc>
+                  <a:txBody>
+                    <a:bodyPr/>
+                    <a:lstStyle/>
+                    <a:p>
+                      <a:pPr marL="0" marR="0">
+                        <a:lnSpc>
+                          <a:spcPct val="107000"/>
+                        </a:lnSpc>
+                        <a:spcBef>
+                          <a:spcPts val="0"/>
+                        </a:spcBef>
+                        <a:spcAft>
+                          <a:spcPts val="0"/>
+                        </a:spcAft>
+                      </a:pPr>
+                      <a:r>
+                        <a:rPr lang="bs-Latn-BA" sz="1300">
+                          <a:effectLst/>
+                        </a:rPr>
+                        <a:t>4</a:t>
+                      </a:r>
+                      <a:endParaRPr lang="en-US" sz="1100">
+                        <a:effectLst/>
+                        <a:latin typeface="Calibri" panose="020F0502020204030204" pitchFamily="34" charset="0"/>
+                        <a:ea typeface="Calibri" panose="020F0502020204030204" pitchFamily="34" charset="0"/>
+                        <a:cs typeface="Times New Roman" panose="02020603050405020304" pitchFamily="18" charset="0"/>
+                      </a:endParaRPr>
+                    </a:p>
+                  </a:txBody>
+                  <a:tcPr marL="68580" marR="68580" marT="0" marB="0"/>
+                </a:tc>
+              </a:tr>
+              <a:tr h="345887">
+                <a:tc>
+                  <a:txBody>
+                    <a:bodyPr/>
+                    <a:lstStyle/>
+                    <a:p>
+                      <a:pPr marL="0" marR="0">
+                        <a:lnSpc>
+                          <a:spcPct val="107000"/>
+                        </a:lnSpc>
+                        <a:spcBef>
+                          <a:spcPts val="0"/>
+                        </a:spcBef>
+                        <a:spcAft>
+                          <a:spcPts val="0"/>
+                        </a:spcAft>
+                      </a:pPr>
+                      <a:r>
+                        <a:rPr lang="bs-Latn-BA" sz="1300">
+                          <a:effectLst/>
+                        </a:rPr>
+                        <a:t>0.01</a:t>
+                      </a:r>
+                      <a:endParaRPr lang="en-US" sz="1100">
+                        <a:effectLst/>
+                        <a:latin typeface="Calibri" panose="020F0502020204030204" pitchFamily="34" charset="0"/>
+                        <a:ea typeface="Calibri" panose="020F0502020204030204" pitchFamily="34" charset="0"/>
+                        <a:cs typeface="Times New Roman" panose="02020603050405020304" pitchFamily="18" charset="0"/>
+                      </a:endParaRPr>
+                    </a:p>
+                  </a:txBody>
+                  <a:tcPr marL="68580" marR="68580" marT="0" marB="0"/>
+                </a:tc>
+                <a:tc>
+                  <a:txBody>
+                    <a:bodyPr/>
+                    <a:lstStyle/>
+                    <a:p>
+                      <a:pPr marL="0" marR="0">
+                        <a:lnSpc>
+                          <a:spcPct val="107000"/>
+                        </a:lnSpc>
+                        <a:spcBef>
+                          <a:spcPts val="0"/>
+                        </a:spcBef>
+                        <a:spcAft>
+                          <a:spcPts val="0"/>
+                        </a:spcAft>
+                      </a:pPr>
+                      <a:r>
+                        <a:rPr lang="bs-Latn-BA" sz="1300">
+                          <a:effectLst/>
+                        </a:rPr>
+                        <a:t>0.2</a:t>
+                      </a:r>
+                      <a:endParaRPr lang="en-US" sz="1100">
+                        <a:effectLst/>
+                        <a:latin typeface="Calibri" panose="020F0502020204030204" pitchFamily="34" charset="0"/>
+                        <a:ea typeface="Calibri" panose="020F0502020204030204" pitchFamily="34" charset="0"/>
+                        <a:cs typeface="Times New Roman" panose="02020603050405020304" pitchFamily="18" charset="0"/>
+                      </a:endParaRPr>
+                    </a:p>
+                  </a:txBody>
+                  <a:tcPr marL="68580" marR="68580" marT="0" marB="0"/>
+                </a:tc>
+                <a:tc>
+                  <a:txBody>
+                    <a:bodyPr/>
+                    <a:lstStyle/>
+                    <a:p>
+                      <a:pPr marL="0" marR="0">
+                        <a:lnSpc>
+                          <a:spcPct val="107000"/>
+                        </a:lnSpc>
+                        <a:spcBef>
+                          <a:spcPts val="0"/>
+                        </a:spcBef>
+                        <a:spcAft>
+                          <a:spcPts val="0"/>
+                        </a:spcAft>
+                      </a:pPr>
+                      <a:r>
+                        <a:rPr lang="bs-Latn-BA" sz="1300">
+                          <a:effectLst/>
+                        </a:rPr>
+                        <a:t>3.61</a:t>
+                      </a:r>
+                      <a:endParaRPr lang="en-US" sz="1100">
+                        <a:effectLst/>
+                        <a:latin typeface="Calibri" panose="020F0502020204030204" pitchFamily="34" charset="0"/>
+                        <a:ea typeface="Calibri" panose="020F0502020204030204" pitchFamily="34" charset="0"/>
+                        <a:cs typeface="Times New Roman" panose="02020603050405020304" pitchFamily="18" charset="0"/>
+                      </a:endParaRPr>
+                    </a:p>
+                  </a:txBody>
+                  <a:tcPr marL="68580" marR="68580" marT="0" marB="0"/>
+                </a:tc>
+                <a:tc>
+                  <a:txBody>
+                    <a:bodyPr/>
+                    <a:lstStyle/>
+                    <a:p>
+                      <a:pPr marL="0" marR="0">
+                        <a:lnSpc>
+                          <a:spcPct val="107000"/>
+                        </a:lnSpc>
+                        <a:spcBef>
+                          <a:spcPts val="0"/>
+                        </a:spcBef>
+                        <a:spcAft>
+                          <a:spcPts val="0"/>
+                        </a:spcAft>
+                      </a:pPr>
+                      <a:r>
+                        <a:rPr lang="bs-Latn-BA" sz="1300">
+                          <a:effectLst/>
+                        </a:rPr>
+                        <a:t>5</a:t>
+                      </a:r>
+                      <a:endParaRPr lang="en-US" sz="1100">
+                        <a:effectLst/>
+                        <a:latin typeface="Calibri" panose="020F0502020204030204" pitchFamily="34" charset="0"/>
+                        <a:ea typeface="Calibri" panose="020F0502020204030204" pitchFamily="34" charset="0"/>
+                        <a:cs typeface="Times New Roman" panose="02020603050405020304" pitchFamily="18" charset="0"/>
+                      </a:endParaRPr>
+                    </a:p>
+                  </a:txBody>
+                  <a:tcPr marL="68580" marR="68580" marT="0" marB="0"/>
+                </a:tc>
+              </a:tr>
+              <a:tr h="345887">
+                <a:tc>
+                  <a:txBody>
+                    <a:bodyPr/>
+                    <a:lstStyle/>
+                    <a:p>
+                      <a:pPr marL="0" marR="0">
+                        <a:lnSpc>
+                          <a:spcPct val="107000"/>
+                        </a:lnSpc>
+                        <a:spcBef>
+                          <a:spcPts val="0"/>
+                        </a:spcBef>
+                        <a:spcAft>
+                          <a:spcPts val="0"/>
+                        </a:spcAft>
+                      </a:pPr>
+                      <a:r>
+                        <a:rPr lang="bs-Latn-BA" sz="1300">
+                          <a:effectLst/>
+                        </a:rPr>
+                        <a:t>0.1</a:t>
+                      </a:r>
+                      <a:endParaRPr lang="en-US" sz="1100">
+                        <a:effectLst/>
+                        <a:latin typeface="Calibri" panose="020F0502020204030204" pitchFamily="34" charset="0"/>
+                        <a:ea typeface="Calibri" panose="020F0502020204030204" pitchFamily="34" charset="0"/>
+                        <a:cs typeface="Times New Roman" panose="02020603050405020304" pitchFamily="18" charset="0"/>
+                      </a:endParaRPr>
+                    </a:p>
+                  </a:txBody>
+                  <a:tcPr marL="68580" marR="68580" marT="0" marB="0"/>
+                </a:tc>
+                <a:tc>
+                  <a:txBody>
+                    <a:bodyPr/>
+                    <a:lstStyle/>
+                    <a:p>
+                      <a:pPr marL="0" marR="0">
+                        <a:lnSpc>
+                          <a:spcPct val="107000"/>
+                        </a:lnSpc>
+                        <a:spcBef>
+                          <a:spcPts val="0"/>
+                        </a:spcBef>
+                        <a:spcAft>
+                          <a:spcPts val="0"/>
+                        </a:spcAft>
+                      </a:pPr>
+                      <a:r>
+                        <a:rPr lang="bs-Latn-BA" sz="1300">
+                          <a:effectLst/>
+                        </a:rPr>
+                        <a:t>0.4</a:t>
+                      </a:r>
+                      <a:endParaRPr lang="en-US" sz="1100">
+                        <a:effectLst/>
+                        <a:latin typeface="Calibri" panose="020F0502020204030204" pitchFamily="34" charset="0"/>
+                        <a:ea typeface="Calibri" panose="020F0502020204030204" pitchFamily="34" charset="0"/>
+                        <a:cs typeface="Times New Roman" panose="02020603050405020304" pitchFamily="18" charset="0"/>
+                      </a:endParaRPr>
+                    </a:p>
+                  </a:txBody>
+                  <a:tcPr marL="68580" marR="68580" marT="0" marB="0"/>
+                </a:tc>
+                <a:tc>
+                  <a:txBody>
+                    <a:bodyPr/>
+                    <a:lstStyle/>
+                    <a:p>
+                      <a:pPr marL="0" marR="0">
+                        <a:lnSpc>
+                          <a:spcPct val="107000"/>
+                        </a:lnSpc>
+                        <a:spcBef>
+                          <a:spcPts val="0"/>
+                        </a:spcBef>
+                        <a:spcAft>
+                          <a:spcPts val="0"/>
+                        </a:spcAft>
+                      </a:pPr>
+                      <a:r>
+                        <a:rPr lang="bs-Latn-BA" sz="1300">
+                          <a:effectLst/>
+                        </a:rPr>
+                        <a:t>7.73</a:t>
+                      </a:r>
+                      <a:endParaRPr lang="en-US" sz="1100">
+                        <a:effectLst/>
+                        <a:latin typeface="Calibri" panose="020F0502020204030204" pitchFamily="34" charset="0"/>
+                        <a:ea typeface="Calibri" panose="020F0502020204030204" pitchFamily="34" charset="0"/>
+                        <a:cs typeface="Times New Roman" panose="02020603050405020304" pitchFamily="18" charset="0"/>
+                      </a:endParaRPr>
+                    </a:p>
+                  </a:txBody>
+                  <a:tcPr marL="68580" marR="68580" marT="0" marB="0"/>
+                </a:tc>
+                <a:tc>
+                  <a:txBody>
+                    <a:bodyPr/>
+                    <a:lstStyle/>
+                    <a:p>
+                      <a:pPr marL="0" marR="0">
+                        <a:lnSpc>
+                          <a:spcPct val="107000"/>
+                        </a:lnSpc>
+                        <a:spcBef>
+                          <a:spcPts val="0"/>
+                        </a:spcBef>
+                        <a:spcAft>
+                          <a:spcPts val="0"/>
+                        </a:spcAft>
+                      </a:pPr>
+                      <a:r>
+                        <a:rPr lang="bs-Latn-BA" sz="1300">
+                          <a:effectLst/>
+                        </a:rPr>
+                        <a:t>3</a:t>
+                      </a:r>
+                      <a:endParaRPr lang="en-US" sz="1100">
+                        <a:effectLst/>
+                        <a:latin typeface="Calibri" panose="020F0502020204030204" pitchFamily="34" charset="0"/>
+                        <a:ea typeface="Calibri" panose="020F0502020204030204" pitchFamily="34" charset="0"/>
+                        <a:cs typeface="Times New Roman" panose="02020603050405020304" pitchFamily="18" charset="0"/>
+                      </a:endParaRPr>
+                    </a:p>
+                  </a:txBody>
+                  <a:tcPr marL="68580" marR="68580" marT="0" marB="0"/>
+                </a:tc>
+              </a:tr>
+              <a:tr h="345887">
+                <a:tc>
+                  <a:txBody>
+                    <a:bodyPr/>
+                    <a:lstStyle/>
+                    <a:p>
+                      <a:pPr marL="0" marR="0">
+                        <a:lnSpc>
+                          <a:spcPct val="107000"/>
+                        </a:lnSpc>
+                        <a:spcBef>
+                          <a:spcPts val="0"/>
+                        </a:spcBef>
+                        <a:spcAft>
+                          <a:spcPts val="0"/>
+                        </a:spcAft>
+                      </a:pPr>
+                      <a:r>
+                        <a:rPr lang="bs-Latn-BA" sz="1300">
+                          <a:effectLst/>
+                        </a:rPr>
+                        <a:t>0.01</a:t>
+                      </a:r>
+                      <a:endParaRPr lang="en-US" sz="1100">
+                        <a:effectLst/>
+                        <a:latin typeface="Calibri" panose="020F0502020204030204" pitchFamily="34" charset="0"/>
+                        <a:ea typeface="Calibri" panose="020F0502020204030204" pitchFamily="34" charset="0"/>
+                        <a:cs typeface="Times New Roman" panose="02020603050405020304" pitchFamily="18" charset="0"/>
+                      </a:endParaRPr>
+                    </a:p>
+                  </a:txBody>
+                  <a:tcPr marL="68580" marR="68580" marT="0" marB="0"/>
+                </a:tc>
+                <a:tc>
+                  <a:txBody>
+                    <a:bodyPr/>
+                    <a:lstStyle/>
+                    <a:p>
+                      <a:pPr marL="0" marR="0">
+                        <a:lnSpc>
+                          <a:spcPct val="107000"/>
+                        </a:lnSpc>
+                        <a:spcBef>
+                          <a:spcPts val="0"/>
+                        </a:spcBef>
+                        <a:spcAft>
+                          <a:spcPts val="0"/>
+                        </a:spcAft>
+                      </a:pPr>
+                      <a:r>
+                        <a:rPr lang="bs-Latn-BA" sz="1300">
+                          <a:effectLst/>
+                        </a:rPr>
+                        <a:t>0.4</a:t>
+                      </a:r>
+                      <a:endParaRPr lang="en-US" sz="1100">
+                        <a:effectLst/>
+                        <a:latin typeface="Calibri" panose="020F0502020204030204" pitchFamily="34" charset="0"/>
+                        <a:ea typeface="Calibri" panose="020F0502020204030204" pitchFamily="34" charset="0"/>
+                        <a:cs typeface="Times New Roman" panose="02020603050405020304" pitchFamily="18" charset="0"/>
+                      </a:endParaRPr>
+                    </a:p>
+                  </a:txBody>
+                  <a:tcPr marL="68580" marR="68580" marT="0" marB="0"/>
+                </a:tc>
+                <a:tc>
+                  <a:txBody>
+                    <a:bodyPr/>
+                    <a:lstStyle/>
+                    <a:p>
+                      <a:pPr marL="0" marR="0">
+                        <a:lnSpc>
+                          <a:spcPct val="107000"/>
+                        </a:lnSpc>
+                        <a:spcBef>
+                          <a:spcPts val="0"/>
+                        </a:spcBef>
+                        <a:spcAft>
+                          <a:spcPts val="0"/>
+                        </a:spcAft>
+                      </a:pPr>
+                      <a:r>
+                        <a:rPr lang="bs-Latn-BA" sz="1300">
+                          <a:effectLst/>
+                        </a:rPr>
+                        <a:t>4.61</a:t>
+                      </a:r>
+                      <a:endParaRPr lang="en-US" sz="1100">
+                        <a:effectLst/>
+                        <a:latin typeface="Calibri" panose="020F0502020204030204" pitchFamily="34" charset="0"/>
+                        <a:ea typeface="Calibri" panose="020F0502020204030204" pitchFamily="34" charset="0"/>
+                        <a:cs typeface="Times New Roman" panose="02020603050405020304" pitchFamily="18" charset="0"/>
+                      </a:endParaRPr>
+                    </a:p>
+                  </a:txBody>
+                  <a:tcPr marL="68580" marR="68580" marT="0" marB="0"/>
+                </a:tc>
+                <a:tc>
+                  <a:txBody>
+                    <a:bodyPr/>
+                    <a:lstStyle/>
+                    <a:p>
+                      <a:pPr marL="0" marR="0">
+                        <a:lnSpc>
+                          <a:spcPct val="107000"/>
+                        </a:lnSpc>
+                        <a:spcBef>
+                          <a:spcPts val="0"/>
+                        </a:spcBef>
+                        <a:spcAft>
+                          <a:spcPts val="0"/>
+                        </a:spcAft>
+                      </a:pPr>
+                      <a:r>
+                        <a:rPr lang="bs-Latn-BA" sz="1300">
+                          <a:effectLst/>
+                        </a:rPr>
+                        <a:t>4</a:t>
+                      </a:r>
+                      <a:endParaRPr lang="en-US" sz="1100">
+                        <a:effectLst/>
+                        <a:latin typeface="Calibri" panose="020F0502020204030204" pitchFamily="34" charset="0"/>
+                        <a:ea typeface="Calibri" panose="020F0502020204030204" pitchFamily="34" charset="0"/>
+                        <a:cs typeface="Times New Roman" panose="02020603050405020304" pitchFamily="18" charset="0"/>
+                      </a:endParaRPr>
+                    </a:p>
+                  </a:txBody>
+                  <a:tcPr marL="68580" marR="68580" marT="0" marB="0"/>
+                </a:tc>
+              </a:tr>
+              <a:tr h="345887">
+                <a:tc>
+                  <a:txBody>
+                    <a:bodyPr/>
+                    <a:lstStyle/>
+                    <a:p>
+                      <a:pPr marL="0" marR="0">
+                        <a:lnSpc>
+                          <a:spcPct val="107000"/>
+                        </a:lnSpc>
+                        <a:spcBef>
+                          <a:spcPts val="0"/>
+                        </a:spcBef>
+                        <a:spcAft>
+                          <a:spcPts val="0"/>
+                        </a:spcAft>
+                      </a:pPr>
+                      <a:r>
+                        <a:rPr lang="bs-Latn-BA" sz="1300">
+                          <a:effectLst/>
+                        </a:rPr>
+                        <a:t>0.1</a:t>
+                      </a:r>
+                      <a:endParaRPr lang="en-US" sz="1100">
+                        <a:effectLst/>
+                        <a:latin typeface="Calibri" panose="020F0502020204030204" pitchFamily="34" charset="0"/>
+                        <a:ea typeface="Calibri" panose="020F0502020204030204" pitchFamily="34" charset="0"/>
+                        <a:cs typeface="Times New Roman" panose="02020603050405020304" pitchFamily="18" charset="0"/>
+                      </a:endParaRPr>
+                    </a:p>
+                  </a:txBody>
+                  <a:tcPr marL="68580" marR="68580" marT="0" marB="0"/>
+                </a:tc>
+                <a:tc>
+                  <a:txBody>
+                    <a:bodyPr/>
+                    <a:lstStyle/>
+                    <a:p>
+                      <a:pPr marL="0" marR="0">
+                        <a:lnSpc>
+                          <a:spcPct val="107000"/>
+                        </a:lnSpc>
+                        <a:spcBef>
+                          <a:spcPts val="0"/>
+                        </a:spcBef>
+                        <a:spcAft>
+                          <a:spcPts val="0"/>
+                        </a:spcAft>
+                      </a:pPr>
+                      <a:r>
+                        <a:rPr lang="bs-Latn-BA" sz="1300">
+                          <a:effectLst/>
+                        </a:rPr>
+                        <a:t>0.6</a:t>
+                      </a:r>
+                      <a:endParaRPr lang="en-US" sz="1100">
+                        <a:effectLst/>
+                        <a:latin typeface="Calibri" panose="020F0502020204030204" pitchFamily="34" charset="0"/>
+                        <a:ea typeface="Calibri" panose="020F0502020204030204" pitchFamily="34" charset="0"/>
+                        <a:cs typeface="Times New Roman" panose="02020603050405020304" pitchFamily="18" charset="0"/>
+                      </a:endParaRPr>
+                    </a:p>
+                  </a:txBody>
+                  <a:tcPr marL="68580" marR="68580" marT="0" marB="0"/>
+                </a:tc>
+                <a:tc>
+                  <a:txBody>
+                    <a:bodyPr/>
+                    <a:lstStyle/>
+                    <a:p>
+                      <a:pPr marL="0" marR="0">
+                        <a:lnSpc>
+                          <a:spcPct val="107000"/>
+                        </a:lnSpc>
+                        <a:spcBef>
+                          <a:spcPts val="0"/>
+                        </a:spcBef>
+                        <a:spcAft>
+                          <a:spcPts val="0"/>
+                        </a:spcAft>
+                      </a:pPr>
+                      <a:r>
+                        <a:rPr lang="bs-Latn-BA" sz="1300">
+                          <a:effectLst/>
+                        </a:rPr>
+                        <a:t>8.01</a:t>
+                      </a:r>
+                      <a:endParaRPr lang="en-US" sz="1100">
+                        <a:effectLst/>
+                        <a:latin typeface="Calibri" panose="020F0502020204030204" pitchFamily="34" charset="0"/>
+                        <a:ea typeface="Calibri" panose="020F0502020204030204" pitchFamily="34" charset="0"/>
+                        <a:cs typeface="Times New Roman" panose="02020603050405020304" pitchFamily="18" charset="0"/>
+                      </a:endParaRPr>
+                    </a:p>
+                  </a:txBody>
+                  <a:tcPr marL="68580" marR="68580" marT="0" marB="0"/>
+                </a:tc>
+                <a:tc>
+                  <a:txBody>
+                    <a:bodyPr/>
+                    <a:lstStyle/>
+                    <a:p>
+                      <a:pPr marL="0" marR="0">
+                        <a:lnSpc>
+                          <a:spcPct val="107000"/>
+                        </a:lnSpc>
+                        <a:spcBef>
+                          <a:spcPts val="0"/>
+                        </a:spcBef>
+                        <a:spcAft>
+                          <a:spcPts val="0"/>
+                        </a:spcAft>
+                      </a:pPr>
+                      <a:r>
+                        <a:rPr lang="bs-Latn-BA" sz="1300">
+                          <a:effectLst/>
+                        </a:rPr>
+                        <a:t>2</a:t>
+                      </a:r>
+                      <a:endParaRPr lang="en-US" sz="1100">
+                        <a:effectLst/>
+                        <a:latin typeface="Calibri" panose="020F0502020204030204" pitchFamily="34" charset="0"/>
+                        <a:ea typeface="Calibri" panose="020F0502020204030204" pitchFamily="34" charset="0"/>
+                        <a:cs typeface="Times New Roman" panose="02020603050405020304" pitchFamily="18" charset="0"/>
+                      </a:endParaRPr>
+                    </a:p>
+                  </a:txBody>
+                  <a:tcPr marL="68580" marR="68580" marT="0" marB="0"/>
+                </a:tc>
+              </a:tr>
+            </a:tbl>
+          </a:graphicData>
+        </a:graphic>
+      </p:graphicFrame>
     </p:spTree>
     <p:extLst>
       <p:ext uri="{BB962C8B-B14F-4D97-AF65-F5344CB8AC3E}">
-        <p14:creationId xmlns:p14="http://schemas.microsoft.com/office/powerpoint/2010/main" val="4172196075"/>
+        <p14:creationId xmlns:p14="http://schemas.microsoft.com/office/powerpoint/2010/main" val="1592586502"/>
       </p:ext>
     </p:extLst>
   </p:cSld>
@@ -4277,532 +5957,6 @@
 </file>
 
 <file path=ppt/slides/slide16.xml><?xml version="1.0" encoding="utf-8"?>
-<p:sld xmlns:a="http://schemas.openxmlformats.org/drawingml/2006/main" xmlns:r="http://schemas.openxmlformats.org/officeDocument/2006/relationships" xmlns:p="http://schemas.openxmlformats.org/presentationml/2006/main">
-  <p:cSld>
-    <p:spTree>
-      <p:nvGrpSpPr>
-        <p:cNvPr id="1" name=""/>
-        <p:cNvGrpSpPr/>
-        <p:nvPr/>
-      </p:nvGrpSpPr>
-      <p:grpSpPr>
-        <a:xfrm>
-          <a:off x="0" y="0"/>
-          <a:ext cx="0" cy="0"/>
-          <a:chOff x="0" y="0"/>
-          <a:chExt cx="0" cy="0"/>
-        </a:xfrm>
-      </p:grpSpPr>
-      <p:sp>
-        <p:nvSpPr>
-          <p:cNvPr id="2" name="Title 1"/>
-          <p:cNvSpPr>
-            <a:spLocks noGrp="1"/>
-          </p:cNvSpPr>
-          <p:nvPr>
-            <p:ph type="title"/>
-          </p:nvPr>
-        </p:nvSpPr>
-        <p:spPr>
-          <a:xfrm>
-            <a:off x="829654" y="11606"/>
-            <a:ext cx="10515600" cy="1325563"/>
-          </a:xfrm>
-        </p:spPr>
-        <p:txBody>
-          <a:bodyPr>
-            <a:normAutofit/>
-          </a:bodyPr>
-          <a:lstStyle/>
-          <a:p>
-            <a:r>
-              <a:rPr lang="en-US" sz="4000" smtClean="0"/>
-              <a:t>Evaluacija generacije</a:t>
-            </a:r>
-            <a:endParaRPr lang="en-US" sz="4000"/>
-          </a:p>
-        </p:txBody>
-      </p:sp>
-      <p:sp>
-        <p:nvSpPr>
-          <p:cNvPr id="3" name="Content Placeholder 2"/>
-          <p:cNvSpPr>
-            <a:spLocks noGrp="1"/>
-          </p:cNvSpPr>
-          <p:nvPr>
-            <p:ph idx="1"/>
-          </p:nvPr>
-        </p:nvSpPr>
-        <p:spPr>
-          <a:xfrm>
-            <a:off x="193706" y="1230594"/>
-            <a:ext cx="11351662" cy="5221481"/>
-          </a:xfrm>
-        </p:spPr>
-        <p:txBody>
-          <a:bodyPr>
-            <a:normAutofit/>
-          </a:bodyPr>
-          <a:lstStyle/>
-          <a:p>
-            <a:r>
-              <a:rPr lang="en-US" sz="2000" smtClean="0"/>
-              <a:t>Rezultati:</a:t>
-            </a:r>
-          </a:p>
-          <a:p>
-            <a:r>
-              <a:rPr lang="en-US" sz="2000" smtClean="0"/>
-              <a:t>Kada sam koristio obi</a:t>
-            </a:r>
-            <a:r>
-              <a:rPr lang="bs-Latn-BA" sz="2000"/>
-              <a:t>č</a:t>
-            </a:r>
-            <a:r>
-              <a:rPr lang="en-US" sz="2000" smtClean="0"/>
-              <a:t>nu evaluaciju svak</a:t>
-            </a:r>
-            <a:r>
-              <a:rPr lang="bs-Latn-BA" sz="2000" smtClean="0"/>
-              <a:t>e jedinke </a:t>
-            </a:r>
-            <a:r>
-              <a:rPr lang="en-US" sz="2000" smtClean="0"/>
-              <a:t>pomo</a:t>
-            </a:r>
-            <a:r>
-              <a:rPr lang="bs-Latn-BA" sz="2000" smtClean="0"/>
-              <a:t>ć</a:t>
-            </a:r>
-            <a:r>
-              <a:rPr lang="en-US" sz="2000" smtClean="0"/>
-              <a:t>u </a:t>
-            </a:r>
-            <a:r>
-              <a:rPr lang="en-US" sz="2000" b="1" smtClean="0"/>
-              <a:t>Mannhattan</a:t>
-            </a:r>
-            <a:r>
-              <a:rPr lang="en-US" sz="2000" smtClean="0"/>
-              <a:t> rastojanja:</a:t>
-            </a:r>
-          </a:p>
-          <a:p>
-            <a:pPr marL="0" indent="0">
-              <a:buNone/>
-            </a:pPr>
-            <a:r>
-              <a:rPr lang="en-US" sz="1100" smtClean="0"/>
-              <a:t>test id=0; seed=42; num of generations=51; fitness=6</a:t>
-            </a:r>
-          </a:p>
-          <a:p>
-            <a:pPr marL="0" indent="0">
-              <a:buNone/>
-            </a:pPr>
-            <a:r>
-              <a:rPr lang="en-US" sz="1100" smtClean="0"/>
-              <a:t>test id=1; seed=43; num of generations=51; fitness=8</a:t>
-            </a:r>
-          </a:p>
-          <a:p>
-            <a:pPr marL="0" indent="0">
-              <a:buNone/>
-            </a:pPr>
-            <a:r>
-              <a:rPr lang="en-US" sz="1100" smtClean="0"/>
-              <a:t>test id=2; seed=44; num of generations=51; fitness=10</a:t>
-            </a:r>
-          </a:p>
-          <a:p>
-            <a:pPr marL="0" indent="0">
-              <a:buNone/>
-            </a:pPr>
-            <a:r>
-              <a:rPr lang="en-US" sz="1100" smtClean="0"/>
-              <a:t>test id=3; seed=45; num of generations=51; fitness=4</a:t>
-            </a:r>
-          </a:p>
-          <a:p>
-            <a:pPr marL="0" indent="0">
-              <a:buNone/>
-            </a:pPr>
-            <a:r>
-              <a:rPr lang="en-US" sz="1100" smtClean="0"/>
-              <a:t>test id=4; seed=46; num of generations=51; fitness=2</a:t>
-            </a:r>
-          </a:p>
-          <a:p>
-            <a:pPr marL="0" indent="0">
-              <a:buNone/>
-            </a:pPr>
-            <a:r>
-              <a:rPr lang="en-US" sz="1100" smtClean="0"/>
-              <a:t>test id=5; seed=47; num of generations=51; fitness=22</a:t>
-            </a:r>
-          </a:p>
-          <a:p>
-            <a:pPr marL="0" indent="0">
-              <a:buNone/>
-            </a:pPr>
-            <a:r>
-              <a:rPr lang="en-US" sz="1100" smtClean="0"/>
-              <a:t>test id=6; seed=48; num of generations=51; fitness=14</a:t>
-            </a:r>
-          </a:p>
-          <a:p>
-            <a:pPr marL="0" indent="0">
-              <a:buNone/>
-            </a:pPr>
-            <a:r>
-              <a:rPr lang="en-US" sz="1100" smtClean="0"/>
-              <a:t>test id=7; seed=49; num of generations=51; fitness=10</a:t>
-            </a:r>
-          </a:p>
-          <a:p>
-            <a:pPr marL="0" indent="0">
-              <a:buNone/>
-            </a:pPr>
-            <a:r>
-              <a:rPr lang="en-US" sz="1100" smtClean="0"/>
-              <a:t>test id=8; seed=50; num of generations=51; fitness=12</a:t>
-            </a:r>
-          </a:p>
-          <a:p>
-            <a:pPr marL="0" indent="0">
-              <a:buNone/>
-            </a:pPr>
-            <a:r>
-              <a:rPr lang="en-US" sz="1100" smtClean="0"/>
-              <a:t>test id=9; seed=51; num of generations=11; fitness=0</a:t>
-            </a:r>
-          </a:p>
-          <a:p>
-            <a:pPr marL="0" indent="0">
-              <a:buNone/>
-            </a:pPr>
-            <a:r>
-              <a:rPr lang="en-US" sz="1100" smtClean="0"/>
-              <a:t>test id=10; seed=52; num of generations=51; fitness=8</a:t>
-            </a:r>
-          </a:p>
-          <a:p>
-            <a:pPr marL="0" indent="0">
-              <a:buNone/>
-            </a:pPr>
-            <a:r>
-              <a:rPr lang="en-US" sz="1600" b="1" smtClean="0"/>
-              <a:t>AVG</a:t>
-            </a:r>
-            <a:r>
-              <a:rPr lang="en-US" sz="1600" smtClean="0"/>
-              <a:t>= 96 / 11 = </a:t>
-            </a:r>
-            <a:r>
-              <a:rPr lang="en-US" sz="1600" b="1"/>
-              <a:t>8</a:t>
-            </a:r>
-            <a:r>
-              <a:rPr lang="en-US" sz="1600" b="1" smtClean="0"/>
-              <a:t>.7</a:t>
-            </a:r>
-            <a:endParaRPr lang="en-US" sz="1600" smtClean="0"/>
-          </a:p>
-          <a:p>
-            <a:pPr marL="0" indent="0">
-              <a:buNone/>
-            </a:pPr>
-            <a:r>
-              <a:rPr lang="en-US" sz="2000" smtClean="0"/>
-              <a:t>Od 11 testova. Za samo 1 test je na</a:t>
-            </a:r>
-            <a:r>
-              <a:rPr lang="bs-Latn-BA" sz="2000" smtClean="0"/>
-              <a:t>đeno rješenje</a:t>
-            </a:r>
-          </a:p>
-        </p:txBody>
-      </p:sp>
-    </p:spTree>
-    <p:extLst>
-      <p:ext uri="{BB962C8B-B14F-4D97-AF65-F5344CB8AC3E}">
-        <p14:creationId xmlns:p14="http://schemas.microsoft.com/office/powerpoint/2010/main" val="56841531"/>
-      </p:ext>
-    </p:extLst>
-  </p:cSld>
-  <p:clrMapOvr>
-    <a:masterClrMapping/>
-  </p:clrMapOvr>
-</p:sld>
-</file>
-
-<file path=ppt/slides/slide17.xml><?xml version="1.0" encoding="utf-8"?>
-<p:sld xmlns:a="http://schemas.openxmlformats.org/drawingml/2006/main" xmlns:r="http://schemas.openxmlformats.org/officeDocument/2006/relationships" xmlns:p="http://schemas.openxmlformats.org/presentationml/2006/main">
-  <p:cSld>
-    <p:spTree>
-      <p:nvGrpSpPr>
-        <p:cNvPr id="1" name=""/>
-        <p:cNvGrpSpPr/>
-        <p:nvPr/>
-      </p:nvGrpSpPr>
-      <p:grpSpPr>
-        <a:xfrm>
-          <a:off x="0" y="0"/>
-          <a:ext cx="0" cy="0"/>
-          <a:chOff x="0" y="0"/>
-          <a:chExt cx="0" cy="0"/>
-        </a:xfrm>
-      </p:grpSpPr>
-      <p:sp>
-        <p:nvSpPr>
-          <p:cNvPr id="2" name="Title 1"/>
-          <p:cNvSpPr>
-            <a:spLocks noGrp="1"/>
-          </p:cNvSpPr>
-          <p:nvPr>
-            <p:ph type="title"/>
-          </p:nvPr>
-        </p:nvSpPr>
-        <p:spPr>
-          <a:xfrm>
-            <a:off x="829654" y="11606"/>
-            <a:ext cx="10515600" cy="1325563"/>
-          </a:xfrm>
-        </p:spPr>
-        <p:txBody>
-          <a:bodyPr>
-            <a:normAutofit/>
-          </a:bodyPr>
-          <a:lstStyle/>
-          <a:p>
-            <a:r>
-              <a:rPr lang="en-US" sz="4000" smtClean="0"/>
-              <a:t>Evaluacija generacije</a:t>
-            </a:r>
-            <a:endParaRPr lang="en-US" sz="4000"/>
-          </a:p>
-        </p:txBody>
-      </p:sp>
-      <p:sp>
-        <p:nvSpPr>
-          <p:cNvPr id="3" name="Content Placeholder 2"/>
-          <p:cNvSpPr>
-            <a:spLocks noGrp="1"/>
-          </p:cNvSpPr>
-          <p:nvPr>
-            <p:ph idx="1"/>
-          </p:nvPr>
-        </p:nvSpPr>
-        <p:spPr>
-          <a:xfrm>
-            <a:off x="193706" y="1230594"/>
-            <a:ext cx="11351662" cy="5221481"/>
-          </a:xfrm>
-        </p:spPr>
-        <p:txBody>
-          <a:bodyPr>
-            <a:normAutofit/>
-          </a:bodyPr>
-          <a:lstStyle/>
-          <a:p>
-            <a:r>
-              <a:rPr lang="en-US" sz="2000" smtClean="0"/>
-              <a:t>Rezultati:</a:t>
-            </a:r>
-          </a:p>
-          <a:p>
-            <a:r>
-              <a:rPr lang="en-US" sz="2000" smtClean="0"/>
-              <a:t>Kada sam koristio obi</a:t>
-            </a:r>
-            <a:r>
-              <a:rPr lang="bs-Latn-BA" sz="2000" smtClean="0"/>
-              <a:t>č</a:t>
-            </a:r>
-            <a:r>
-              <a:rPr lang="en-US" sz="2000" smtClean="0"/>
-              <a:t>nu evaluaciju svak</a:t>
-            </a:r>
-            <a:r>
-              <a:rPr lang="bs-Latn-BA" sz="2000" smtClean="0"/>
-              <a:t>e</a:t>
-            </a:r>
-            <a:r>
-              <a:rPr lang="en-US" sz="2000" smtClean="0"/>
-              <a:t> </a:t>
-            </a:r>
-            <a:r>
-              <a:rPr lang="bs-Latn-BA" sz="2000" smtClean="0"/>
-              <a:t>jedinke </a:t>
-            </a:r>
-            <a:r>
-              <a:rPr lang="en-US" sz="2000" smtClean="0"/>
-              <a:t>pomo</a:t>
-            </a:r>
-            <a:r>
-              <a:rPr lang="bs-Latn-BA" sz="2000" smtClean="0"/>
-              <a:t>ć</a:t>
-            </a:r>
-            <a:r>
-              <a:rPr lang="en-US" sz="2000" smtClean="0"/>
-              <a:t>u </a:t>
-            </a:r>
-            <a:r>
-              <a:rPr lang="en-US" sz="2000" b="1" smtClean="0"/>
-              <a:t>Euklidskog </a:t>
-            </a:r>
-            <a:r>
-              <a:rPr lang="en-US" sz="2000" smtClean="0"/>
-              <a:t>rastojanja:</a:t>
-            </a:r>
-          </a:p>
-          <a:p>
-            <a:pPr marL="0" indent="0">
-              <a:buNone/>
-            </a:pPr>
-            <a:r>
-              <a:rPr lang="en-US" sz="1100" smtClean="0"/>
-              <a:t>test id=0; seed=42; num of generations=16; fitness=0.0</a:t>
-            </a:r>
-          </a:p>
-          <a:p>
-            <a:pPr marL="0" indent="0">
-              <a:buNone/>
-            </a:pPr>
-            <a:r>
-              <a:rPr lang="en-US" sz="1100" smtClean="0"/>
-              <a:t>test id=1; seed=43; num of generations=51; fitness=3.1622776601683795</a:t>
-            </a:r>
-          </a:p>
-          <a:p>
-            <a:pPr marL="0" indent="0">
-              <a:buNone/>
-            </a:pPr>
-            <a:r>
-              <a:rPr lang="en-US" sz="1100" smtClean="0"/>
-              <a:t>test id=2; seed=44; num of generations=51; fitness=21.02379604162864</a:t>
-            </a:r>
-          </a:p>
-          <a:p>
-            <a:pPr marL="0" indent="0">
-              <a:buNone/>
-            </a:pPr>
-            <a:r>
-              <a:rPr lang="en-US" sz="1100" smtClean="0"/>
-              <a:t>test id=3; seed=45; num of generations=51; fitness=5.830951894845301</a:t>
-            </a:r>
-          </a:p>
-          <a:p>
-            <a:pPr marL="0" indent="0">
-              <a:buNone/>
-            </a:pPr>
-            <a:r>
-              <a:rPr lang="en-US" sz="1100" smtClean="0"/>
-              <a:t>test id=4; seed=46; num of generations=51; fitness=7.0710678118654755</a:t>
-            </a:r>
-          </a:p>
-          <a:p>
-            <a:pPr marL="0" indent="0">
-              <a:buNone/>
-            </a:pPr>
-            <a:r>
-              <a:rPr lang="en-US" sz="1100" smtClean="0"/>
-              <a:t>test id=5; seed=47; num of generations=41; fitness=0.0</a:t>
-            </a:r>
-          </a:p>
-          <a:p>
-            <a:pPr marL="0" indent="0">
-              <a:buNone/>
-            </a:pPr>
-            <a:r>
-              <a:rPr lang="en-US" sz="1100" smtClean="0"/>
-              <a:t>test id=6; seed=48; num of generations=51; fitness=7.0710678118654755</a:t>
-            </a:r>
-          </a:p>
-          <a:p>
-            <a:pPr marL="0" indent="0">
-              <a:buNone/>
-            </a:pPr>
-            <a:r>
-              <a:rPr lang="en-US" sz="1100" smtClean="0"/>
-              <a:t>test id=7; seed=49; num of generations=51; fitness=24.041630560342615</a:t>
-            </a:r>
-          </a:p>
-          <a:p>
-            <a:pPr marL="0" indent="0">
-              <a:buNone/>
-            </a:pPr>
-            <a:r>
-              <a:rPr lang="en-US" sz="1100" smtClean="0"/>
-              <a:t>test id=8; seed=50; num of generations=51; fitness=11.045361017187261</a:t>
-            </a:r>
-          </a:p>
-          <a:p>
-            <a:pPr marL="0" indent="0">
-              <a:buNone/>
-            </a:pPr>
-            <a:r>
-              <a:rPr lang="en-US" sz="1100" smtClean="0"/>
-              <a:t>test id=9; seed=51; num of generations=30; fitness=0.0</a:t>
-            </a:r>
-          </a:p>
-          <a:p>
-            <a:pPr marL="0" indent="0">
-              <a:buNone/>
-            </a:pPr>
-            <a:r>
-              <a:rPr lang="en-US" sz="1100" smtClean="0"/>
-              <a:t>test id=10; seed=52; num of generations=51; fitness=5.830951894845301</a:t>
-            </a:r>
-          </a:p>
-          <a:p>
-            <a:pPr marL="0" indent="0">
-              <a:buNone/>
-            </a:pPr>
-            <a:r>
-              <a:rPr lang="en-US" sz="1600" b="1" smtClean="0"/>
-              <a:t>AVG</a:t>
-            </a:r>
-            <a:r>
-              <a:rPr lang="en-US" sz="1600" smtClean="0"/>
-              <a:t>= 85.0771046927484485 / 11 = </a:t>
-            </a:r>
-            <a:r>
-              <a:rPr lang="en-US" sz="1600" b="1" smtClean="0"/>
-              <a:t>7.7</a:t>
-            </a:r>
-            <a:endParaRPr lang="en-US" sz="1600" smtClean="0"/>
-          </a:p>
-          <a:p>
-            <a:pPr marL="0" indent="0">
-              <a:buNone/>
-            </a:pPr>
-            <a:r>
-              <a:rPr lang="en-US" sz="2000" smtClean="0"/>
-              <a:t>Od 11 testova. Za samo 3 testa je na</a:t>
-            </a:r>
-            <a:r>
-              <a:rPr lang="bs-Latn-BA" sz="2000" smtClean="0"/>
-              <a:t>đeno rješenje</a:t>
-            </a:r>
-          </a:p>
-        </p:txBody>
-      </p:sp>
-    </p:spTree>
-    <p:extLst>
-      <p:ext uri="{BB962C8B-B14F-4D97-AF65-F5344CB8AC3E}">
-        <p14:creationId xmlns:p14="http://schemas.microsoft.com/office/powerpoint/2010/main" val="4041496897"/>
-      </p:ext>
-    </p:extLst>
-  </p:cSld>
-  <p:clrMapOvr>
-    <a:masterClrMapping/>
-  </p:clrMapOvr>
-</p:sld>
-</file>
-
-<file path=ppt/slides/slide18.xml><?xml version="1.0" encoding="utf-8"?>
 <p:sld xmlns:a="http://schemas.openxmlformats.org/drawingml/2006/main" xmlns:r="http://schemas.openxmlformats.org/officeDocument/2006/relationships" xmlns:p="http://schemas.openxmlformats.org/presentationml/2006/main">
   <p:cSld>
     <p:spTree>
@@ -5237,7 +6391,6 @@
               <a:rPr lang="en-US" smtClean="0"/>
               <a:t>enja</a:t>
             </a:r>
-            <a:endParaRPr lang="en-US" smtClean="0"/>
           </a:p>
           <a:p>
             <a:pPr marL="514350" indent="-514350">
@@ -5420,11 +6573,7 @@
             </a:pPr>
             <a:r>
               <a:rPr lang="en-US" sz="1800" smtClean="0"/>
-              <a:t>[(1,1),(1,2)…(15,5)] i </a:t>
-            </a:r>
-            <a:r>
-              <a:rPr lang="en-US" sz="1800" smtClean="0"/>
-              <a:t>[(1,1),(1,2) …(27,15)]</a:t>
+              <a:t>[(1,1),(1,2)…(15,5)] i [(1,1),(1,2) …(27,15)]</a:t>
             </a:r>
           </a:p>
           <a:p>
@@ -5675,11 +6824,7 @@
             </a:pPr>
             <a:r>
               <a:rPr lang="en-US" sz="1800" smtClean="0"/>
-              <a:t>[(1,1),(1,2)…(15,5)] i </a:t>
-            </a:r>
-            <a:r>
-              <a:rPr lang="en-US" sz="1800" smtClean="0"/>
-              <a:t>[(1,1),(1,2) …(27,15)]</a:t>
+              <a:t>[(1,1),(1,2)…(15,5)] i [(1,1),(1,2) …(27,15)]</a:t>
             </a:r>
           </a:p>
           <a:p>
@@ -5748,7 +6893,15 @@
             </a:pPr>
             <a:r>
               <a:rPr lang="bs-Latn-BA" sz="1800" smtClean="0"/>
-              <a:t>	Problem u ovom pristupu je što nemamo nikakav način da znamo da li je moguće da dođemo iz pozicije X u poziciju Y bez da se stanemo na polje na kome smo već jednom bili.</a:t>
+              <a:t>	Problem u ovom pristupu je što nemamo nikakav način da znamo da li je moguće da dođemo iz pozicije X u poziciju Y bez da </a:t>
+            </a:r>
+            <a:r>
+              <a:rPr lang="bs-Latn-BA" sz="1800" smtClean="0"/>
+              <a:t>ne stanemo </a:t>
+            </a:r>
+            <a:r>
+              <a:rPr lang="bs-Latn-BA" sz="1800" smtClean="0"/>
+              <a:t>na polje na kome smo već jednom bili.</a:t>
             </a:r>
           </a:p>
           <a:p>
@@ -5911,11 +7064,7 @@
             </a:pPr>
             <a:r>
               <a:rPr lang="en-US" sz="1800" smtClean="0"/>
-              <a:t>[(1,1),(1,2)…(15,5)] i </a:t>
-            </a:r>
-            <a:r>
-              <a:rPr lang="en-US" sz="1800" smtClean="0"/>
-              <a:t>[(1,1),(1,2) …(27,15)]</a:t>
+              <a:t>[(1,1),(1,2)…(15,5)] i [(1,1),(1,2) …(27,15)]</a:t>
             </a:r>
           </a:p>
           <a:p>
@@ -6093,11 +7242,7 @@
             </a:pPr>
             <a:r>
               <a:rPr lang="en-US" sz="1800" smtClean="0"/>
-              <a:t>[(1,1),(1,2)…(15,5)] i </a:t>
-            </a:r>
-            <a:r>
-              <a:rPr lang="en-US" sz="1800" smtClean="0"/>
-              <a:t>[(1,1),(1,2) …(27,15)]</a:t>
+              <a:t>[(1,1),(1,2)…(15,5)] i [(1,1),(1,2) …(27,15)]</a:t>
             </a:r>
             <a:endParaRPr lang="bs-Latn-BA" sz="1800" smtClean="0"/>
           </a:p>
@@ -6176,11 +7321,7 @@
             </a:pPr>
             <a:r>
               <a:rPr lang="en-US" sz="1800" smtClean="0"/>
-              <a:t>Izbacujemo iz </a:t>
-            </a:r>
-            <a:r>
-              <a:rPr lang="en-US" sz="1800" smtClean="0"/>
-              <a:t>instukcije_od_drugog roditelja</a:t>
+              <a:t>Izbacujemo iz instukcije_od_drugog roditelja</a:t>
             </a:r>
           </a:p>
           <a:p>
@@ -6206,11 +7347,7 @@
             </a:r>
             <a:r>
               <a:rPr lang="bs-Latn-BA" sz="1800" smtClean="0"/>
-              <a:t>„</a:t>
-            </a:r>
-            <a:r>
-              <a:rPr lang="bs-Latn-BA" sz="1800" smtClean="0"/>
-              <a:t>šeta“ po lavirintu dok ne dođe do ili kraja ili pozicijie iz koje ne može nastaviti se kretati</a:t>
+              <a:t>„šeta“ po lavirintu dok ne dođe do ili kraja ili pozicijie iz koje ne može nastaviti se kretati</a:t>
             </a:r>
             <a:endParaRPr lang="en-US" sz="1800" smtClean="0"/>
           </a:p>

</xml_diff>